<commit_message>
Add speaker bio and GitHub repo link
- Added About Me slide with Jainal's bio
- Updated Resources slide with repo link
- Updated generate_ppt.py with presenter info

🤖 Generated with [Claude Code](https://claude.com/claude-code)

Co-Authored-By: Claude Opus 4.5 <noreply@anthropic.com>
</commit_message>
<xml_diff>
--- a/Azure_AI_Vision_Workshop.pptx
+++ b/Azure_AI_Vision_Workshop.pptx
@@ -23,6 +23,7 @@
     <p:sldId id="1870" r:id="rId22"/>
     <p:sldId id="1871" r:id="rId23"/>
     <p:sldId id="1872" r:id="rId14"/>
+    <p:sldId id="1873" r:id="rId13"/>
   </p:sldIdLst>
   <p:sldSz cx="12192000" cy="6858000"/>
   <p:notesSz cx="6858000" cy="9144000"/>
@@ -17016,7 +17017,131 @@
           <a:lstStyle/>
           <a:p>
             <a:r>
-              <a:t>Q&amp;A</a:t>
+              <a:t>Resources &amp; Next Steps</a:t>
+            </a:r>
+          </a:p>
+        </p:txBody>
+      </p:sp>
+      <p:sp>
+        <p:nvSpPr>
+          <p:cNvPr id="3" name="Text Placeholder 2"/>
+          <p:cNvSpPr>
+            <a:spLocks noGrp="1"/>
+          </p:cNvSpPr>
+          <p:nvPr>
+            <p:ph type="body" idx="10" sz="quarter"/>
+          </p:nvPr>
+        </p:nvSpPr>
+        <p:spPr/>
+        <p:txBody>
+          <a:bodyPr/>
+          <a:lstStyle/>
+          <a:p>
+            <a:pPr>
+              <a:defRPr sz="1800"/>
+            </a:pPr>
+            <a:r>
+              <a:t>Official Documentation</a:t>
+            </a:r>
+          </a:p>
+          <a:p>
+            <a:pPr>
+              <a:defRPr sz="1800"/>
+            </a:pPr>
+            <a:r>
+              <a:t>learn.microsoft.com/azure/ai-services/computer-vision/</a:t>
+            </a:r>
+          </a:p>
+          <a:p>
+            <a:pPr>
+              <a:defRPr sz="1800"/>
+            </a:pPr>
+          </a:p>
+          <a:p>
+            <a:pPr>
+              <a:defRPr sz="1800"/>
+            </a:pPr>
+            <a:r>
+              <a:t>Microsoft Learn Path</a:t>
+            </a:r>
+          </a:p>
+          <a:p>
+            <a:pPr>
+              <a:defRPr sz="1800"/>
+            </a:pPr>
+            <a:r>
+              <a:t>learn.microsoft.com/training/paths/create-computer-vision-solutions-azure-ai/</a:t>
+            </a:r>
+          </a:p>
+          <a:p>
+            <a:pPr>
+              <a:defRPr sz="1800"/>
+            </a:pPr>
+          </a:p>
+          <a:p>
+            <a:pPr>
+              <a:defRPr sz="1800"/>
+            </a:pPr>
+            <a:r>
+              <a:t>Certifications</a:t>
+            </a:r>
+          </a:p>
+          <a:p>
+            <a:pPr>
+              <a:defRPr sz="1800"/>
+            </a:pPr>
+            <a:r>
+              <a:t>- AI-102: Azure AI Engineer Associate</a:t>
+            </a:r>
+          </a:p>
+          <a:p>
+            <a:pPr>
+              <a:defRPr sz="1800"/>
+            </a:pPr>
+            <a:r>
+              <a:t>- AI-900: Azure AI Fundamentals</a:t>
+            </a:r>
+          </a:p>
+          <a:p>
+            <a:pPr>
+              <a:defRPr sz="1800"/>
+            </a:pPr>
+          </a:p>
+          <a:p>
+            <a:pPr>
+              <a:defRPr sz="1800"/>
+            </a:pPr>
+            <a:r>
+              <a:t>Code from Today</a:t>
+            </a:r>
+          </a:p>
+          <a:p>
+            <a:pPr>
+              <a:defRPr sz="1800"/>
+            </a:pPr>
+            <a:r>
+              <a:t>github.com/jainal09/azure-ai-vision-workshop</a:t>
+            </a:r>
+          </a:p>
+          <a:p>
+            <a:pPr>
+              <a:defRPr sz="1800"/>
+            </a:pPr>
+          </a:p>
+          <a:p>
+            <a:pPr>
+              <a:defRPr sz="1800"/>
+            </a:pPr>
+            <a:r>
+              <a:t>Questions? Let's connect!</a:t>
+            </a:r>
+          </a:p>
+          <a:p>
+            <a:pPr>
+              <a:defRPr sz="1800"/>
+            </a:pPr>
+            <a:r>
+              <a:t>linkedin.com/in/jainal-gosaliya</a:t>
             </a:r>
           </a:p>
         </p:txBody>
@@ -17055,6 +17180,45 @@
           <a:lstStyle/>
           <a:p>
             <a:r>
+              <a:t>Q&amp;A</a:t>
+            </a:r>
+          </a:p>
+        </p:txBody>
+      </p:sp>
+    </p:spTree>
+  </p:cSld>
+  <p:clrMapOvr>
+    <a:masterClrMapping/>
+  </p:clrMapOvr>
+</p:sld>
+</file>
+
+<file path=ppt/slides/slide12.xml><?xml version="1.0" encoding="utf-8"?>
+<p:sld xmlns:a="http://schemas.openxmlformats.org/drawingml/2006/main" xmlns:p="http://schemas.openxmlformats.org/presentationml/2006/main" xmlns:r="http://schemas.openxmlformats.org/officeDocument/2006/relationships">
+  <p:cSld>
+    <p:spTree>
+      <p:nvGrpSpPr>
+        <p:cNvPr id="1" name=""/>
+        <p:cNvGrpSpPr/>
+        <p:nvPr/>
+      </p:nvGrpSpPr>
+      <p:grpSpPr/>
+      <p:sp>
+        <p:nvSpPr>
+          <p:cNvPr id="2" name="Title 1"/>
+          <p:cNvSpPr>
+            <a:spLocks noGrp="1"/>
+          </p:cNvSpPr>
+          <p:nvPr>
+            <p:ph type="title"/>
+          </p:nvPr>
+        </p:nvSpPr>
+        <p:spPr/>
+        <p:txBody>
+          <a:bodyPr/>
+          <a:lstStyle/>
+          <a:p>
+            <a:r>
               <a:t>Thank You!</a:t>
             </a:r>
           </a:p>
@@ -17115,7 +17279,7 @@
           <a:lstStyle/>
           <a:p>
             <a:r>
-              <a:t>Azure AI Vision Workshop | Microsoft Student Ambassadors</a:t>
+              <a:t>Azure AI Vision Workshop</a:t>
             </a:r>
           </a:p>
         </p:txBody>
@@ -17154,7 +17318,7 @@
           <a:lstStyle/>
           <a:p>
             <a:r>
-              <a:t>Agenda</a:t>
+              <a:t>About Me</a:t>
             </a:r>
           </a:p>
         </p:txBody>
@@ -17178,7 +17342,7 @@
               <a:defRPr sz="1800"/>
             </a:pPr>
             <a:r>
-              <a:t>What We'll Cover Today</a:t>
+              <a:t>Jainal Gosaliya</a:t>
             </a:r>
           </a:p>
           <a:p>
@@ -17191,23 +17355,20 @@
               <a:defRPr sz="1800"/>
             </a:pPr>
             <a:r>
-              <a:t>- Introduction to Azure AI Vision (5 min)</a:t>
+              <a:t>Beta Microsoft Learn Student Ambassador</a:t>
             </a:r>
           </a:p>
           <a:p>
             <a:pPr>
               <a:defRPr sz="1800"/>
             </a:pPr>
-            <a:r>
-              <a:t>- Key Features &amp; Use Cases (3 min)</a:t>
-            </a:r>
           </a:p>
           <a:p>
             <a:pPr>
               <a:defRPr sz="1800"/>
             </a:pPr>
             <a:r>
-              <a:t>- Live Demo: Build an Image Analyzer (20 min)</a:t>
+              <a:t>Pursuing Masters of Software Engineering Systems</a:t>
             </a:r>
           </a:p>
           <a:p>
@@ -17215,7 +17376,7 @@
               <a:defRPr sz="1800"/>
             </a:pPr>
             <a:r>
-              <a:t>- Q&amp;A (2 min)</a:t>
+              <a:t>at Northeastern University</a:t>
             </a:r>
           </a:p>
           <a:p>
@@ -17228,23 +17389,20 @@
               <a:defRPr sz="1800"/>
             </a:pPr>
             <a:r>
-              <a:t>By the end, you'll be able to:</a:t>
+              <a:t>Loves Python, AI, and Azure!</a:t>
             </a:r>
           </a:p>
           <a:p>
             <a:pPr>
               <a:defRPr sz="1800"/>
             </a:pPr>
-            <a:r>
-              <a:t>- Set up Azure AI Vision from scratch</a:t>
-            </a:r>
           </a:p>
           <a:p>
             <a:pPr>
               <a:defRPr sz="1800"/>
             </a:pPr>
             <a:r>
-              <a:t>- Build a working image analyzer app</a:t>
+              <a:t>Connect with me:</a:t>
             </a:r>
           </a:p>
           <a:p>
@@ -17252,7 +17410,15 @@
               <a:defRPr sz="1800"/>
             </a:pPr>
             <a:r>
-              <a:t>- Extract text, detect objects, and generate captions</a:t>
+              <a:t>linkedin.com/in/jainal-gosaliya</a:t>
+            </a:r>
+          </a:p>
+          <a:p>
+            <a:pPr>
+              <a:defRPr sz="1800"/>
+            </a:pPr>
+            <a:r>
+              <a:t>github.com/jainal09</a:t>
             </a:r>
           </a:p>
         </p:txBody>
@@ -17291,7 +17457,7 @@
           <a:lstStyle/>
           <a:p>
             <a:r>
-              <a:t>What is Azure AI Vision?</a:t>
+              <a:t>Agenda</a:t>
             </a:r>
           </a:p>
         </p:txBody>
@@ -17315,7 +17481,7 @@
               <a:defRPr sz="1800"/>
             </a:pPr>
             <a:r>
-              <a:t>Cloud-based AI service that analyzes images and extracts information</a:t>
+              <a:t>What We'll Cover Today</a:t>
             </a:r>
           </a:p>
           <a:p>
@@ -17328,20 +17494,23 @@
               <a:defRPr sz="1800"/>
             </a:pPr>
             <a:r>
-              <a:t>Part of: Microsoft Foundry Tools (Azure AI Services)</a:t>
+              <a:t>- Introduction to Azure AI Vision (5 min)</a:t>
             </a:r>
           </a:p>
           <a:p>
             <a:pPr>
               <a:defRPr sz="1800"/>
             </a:pPr>
+            <a:r>
+              <a:t>- Key Features &amp; Use Cases (3 min)</a:t>
+            </a:r>
           </a:p>
           <a:p>
             <a:pPr>
               <a:defRPr sz="1800"/>
             </a:pPr>
             <a:r>
-              <a:t>Key Capabilities:</a:t>
+              <a:t>- Live Demo: Build an Image Analyzer (20 min)</a:t>
             </a:r>
           </a:p>
           <a:p>
@@ -17349,23 +17518,20 @@
               <a:defRPr sz="1800"/>
             </a:pPr>
             <a:r>
-              <a:t>- Read and extract text from images (OCR)</a:t>
+              <a:t>- Q&amp;A (2 min)</a:t>
             </a:r>
           </a:p>
           <a:p>
             <a:pPr>
               <a:defRPr sz="1800"/>
             </a:pPr>
-            <a:r>
-              <a:t>- Detect and identify objects in photos</a:t>
-            </a:r>
           </a:p>
           <a:p>
             <a:pPr>
               <a:defRPr sz="1800"/>
             </a:pPr>
             <a:r>
-              <a:t>- Generate human-like image descriptions</a:t>
+              <a:t>By the end, you'll be able to:</a:t>
             </a:r>
           </a:p>
           <a:p>
@@ -17373,49 +17539,23 @@
               <a:defRPr sz="1800"/>
             </a:pPr>
             <a:r>
-              <a:t>- Analyze image content and metadata</a:t>
+              <a:t>- Set up Azure AI Vision from scratch</a:t>
             </a:r>
           </a:p>
           <a:p>
             <a:pPr>
               <a:defRPr sz="1800"/>
             </a:pPr>
+            <a:r>
+              <a:t>- Build a working image analyzer app</a:t>
+            </a:r>
           </a:p>
           <a:p>
             <a:pPr>
               <a:defRPr sz="1800"/>
             </a:pPr>
             <a:r>
-              <a:t>Pricing: Free tier available!</a:t>
-            </a:r>
-          </a:p>
-          <a:p>
-            <a:pPr>
-              <a:defRPr sz="1800"/>
-            </a:pPr>
-            <a:r>
-              <a:t>- 20 calls/minute</a:t>
-            </a:r>
-          </a:p>
-          <a:p>
-            <a:pPr>
-              <a:defRPr sz="1800"/>
-            </a:pPr>
-            <a:r>
-              <a:t>- 5,000 calls/month</a:t>
-            </a:r>
-          </a:p>
-          <a:p>
-            <a:pPr>
-              <a:defRPr sz="1800"/>
-            </a:pPr>
-          </a:p>
-          <a:p>
-            <a:pPr>
-              <a:defRPr sz="1800"/>
-            </a:pPr>
-            <a:r>
-              <a:t>learn.microsoft.com/azure/ai-services/computer-vision/</a:t>
+              <a:t>- Extract text, detect objects, and generate captions</a:t>
             </a:r>
           </a:p>
         </p:txBody>
@@ -17454,7 +17594,7 @@
           <a:lstStyle/>
           <a:p>
             <a:r>
-              <a:t>Key Features</a:t>
+              <a:t>What is Azure AI Vision?</a:t>
             </a:r>
           </a:p>
         </p:txBody>
@@ -17478,49 +17618,49 @@
               <a:defRPr sz="1800"/>
             </a:pPr>
             <a:r>
-              <a:t>OCR (Read)</a:t>
+              <a:t>Cloud-based AI service that analyzes images and extracts information</a:t>
             </a:r>
           </a:p>
           <a:p>
             <a:pPr>
               <a:defRPr sz="1800"/>
             </a:pPr>
-            <a:r>
-              <a:t>Extract printed &amp; handwritten text - scan receipts, documents, signs</a:t>
-            </a:r>
           </a:p>
           <a:p>
             <a:pPr>
               <a:defRPr sz="1800"/>
             </a:pPr>
+            <a:r>
+              <a:t>Part of: Microsoft Foundry Tools (Azure AI Services)</a:t>
+            </a:r>
           </a:p>
           <a:p>
             <a:pPr>
               <a:defRPr sz="1800"/>
             </a:pPr>
-            <a:r>
-              <a:t>Image Captions</a:t>
-            </a:r>
           </a:p>
           <a:p>
             <a:pPr>
               <a:defRPr sz="1800"/>
             </a:pPr>
             <a:r>
-              <a:t>Generate natural language descriptions - "A dog playing in the park"</a:t>
+              <a:t>Key Capabilities:</a:t>
             </a:r>
           </a:p>
           <a:p>
             <a:pPr>
               <a:defRPr sz="1800"/>
             </a:pPr>
+            <a:r>
+              <a:t>- Read and extract text from images (OCR)</a:t>
+            </a:r>
           </a:p>
           <a:p>
             <a:pPr>
               <a:defRPr sz="1800"/>
             </a:pPr>
             <a:r>
-              <a:t>Object Detection</a:t>
+              <a:t>- Detect and identify objects in photos</a:t>
             </a:r>
           </a:p>
           <a:p>
@@ -17528,70 +17668,57 @@
               <a:defRPr sz="1800"/>
             </a:pPr>
             <a:r>
-              <a:t>Identify objects with bounding boxes - find all cars in a parking lot</a:t>
+              <a:t>- Generate human-like image descriptions</a:t>
             </a:r>
           </a:p>
           <a:p>
             <a:pPr>
               <a:defRPr sz="1800"/>
             </a:pPr>
+            <a:r>
+              <a:t>- Analyze image content and metadata</a:t>
+            </a:r>
           </a:p>
           <a:p>
             <a:pPr>
               <a:defRPr sz="1800"/>
             </a:pPr>
-            <a:r>
-              <a:t>Smart Tags</a:t>
-            </a:r>
           </a:p>
           <a:p>
             <a:pPr>
               <a:defRPr sz="1800"/>
             </a:pPr>
             <a:r>
-              <a:t>Label images with keywords - ["outdoor", "nature", "sunny"]</a:t>
+              <a:t>Pricing: Free tier available!</a:t>
             </a:r>
           </a:p>
           <a:p>
             <a:pPr>
               <a:defRPr sz="1800"/>
             </a:pPr>
+            <a:r>
+              <a:t>- 20 calls/minute</a:t>
+            </a:r>
           </a:p>
           <a:p>
             <a:pPr>
               <a:defRPr sz="1800"/>
             </a:pPr>
             <a:r>
-              <a:t>Dense Captions</a:t>
+              <a:t>- 5,000 calls/month</a:t>
             </a:r>
           </a:p>
           <a:p>
             <a:pPr>
               <a:defRPr sz="1800"/>
             </a:pPr>
-            <a:r>
-              <a:t>Multiple captions for different regions of an image</a:t>
-            </a:r>
           </a:p>
           <a:p>
             <a:pPr>
               <a:defRPr sz="1800"/>
             </a:pPr>
-          </a:p>
-          <a:p>
-            <a:pPr>
-              <a:defRPr sz="1800"/>
-            </a:pPr>
-            <a:r>
-              <a:t>People Detection</a:t>
-            </a:r>
-          </a:p>
-          <a:p>
-            <a:pPr>
-              <a:defRPr sz="1800"/>
-            </a:pPr>
-            <a:r>
-              <a:t>Detect people and their positions in photos</a:t>
+            <a:r>
+              <a:t>learn.microsoft.com/azure/ai-services/computer-vision/</a:t>
             </a:r>
           </a:p>
         </p:txBody>
@@ -17630,7 +17757,7 @@
           <a:lstStyle/>
           <a:p>
             <a:r>
-              <a:t>Real-World Use Cases</a:t>
+              <a:t>Key Features</a:t>
             </a:r>
           </a:p>
         </p:txBody>
@@ -17654,7 +17781,7 @@
               <a:defRPr sz="1800"/>
             </a:pPr>
             <a:r>
-              <a:t>Accessibility</a:t>
+              <a:t>OCR (Read)</a:t>
             </a:r>
           </a:p>
           <a:p>
@@ -17662,65 +17789,62 @@
               <a:defRPr sz="1800"/>
             </a:pPr>
             <a:r>
-              <a:t>- Screen readers describing images for visually impaired users</a:t>
+              <a:t>Extract printed &amp; handwritten text - scan receipts, documents, signs</a:t>
             </a:r>
           </a:p>
           <a:p>
             <a:pPr>
               <a:defRPr sz="1800"/>
             </a:pPr>
-            <a:r>
-              <a:t>- Alt-text generation for websites</a:t>
-            </a:r>
           </a:p>
           <a:p>
             <a:pPr>
               <a:defRPr sz="1800"/>
             </a:pPr>
+            <a:r>
+              <a:t>Image Captions</a:t>
+            </a:r>
           </a:p>
           <a:p>
             <a:pPr>
               <a:defRPr sz="1800"/>
             </a:pPr>
             <a:r>
-              <a:t>Retail &amp; E-commerce</a:t>
+              <a:t>Generate natural language descriptions - "A dog playing in the park"</a:t>
             </a:r>
           </a:p>
           <a:p>
             <a:pPr>
               <a:defRPr sz="1800"/>
             </a:pPr>
-            <a:r>
-              <a:t>- Product image tagging</a:t>
-            </a:r>
           </a:p>
           <a:p>
             <a:pPr>
               <a:defRPr sz="1800"/>
             </a:pPr>
             <a:r>
-              <a:t>- Visual search ("find similar items")</a:t>
+              <a:t>Object Detection</a:t>
             </a:r>
           </a:p>
           <a:p>
             <a:pPr>
               <a:defRPr sz="1800"/>
             </a:pPr>
+            <a:r>
+              <a:t>Identify objects with bounding boxes - find all cars in a parking lot</a:t>
+            </a:r>
           </a:p>
           <a:p>
             <a:pPr>
               <a:defRPr sz="1800"/>
             </a:pPr>
-            <a:r>
-              <a:t>Document Processing</a:t>
-            </a:r>
           </a:p>
           <a:p>
             <a:pPr>
               <a:defRPr sz="1800"/>
             </a:pPr>
             <a:r>
-              <a:t>- Digitize paper documents</a:t>
+              <a:t>Smart Tags</a:t>
             </a:r>
           </a:p>
           <a:p>
@@ -17728,7 +17852,7 @@
               <a:defRPr sz="1800"/>
             </a:pPr>
             <a:r>
-              <a:t>- Extract data from forms and receipts</a:t>
+              <a:t>Label images with keywords - ["outdoor", "nature", "sunny"]</a:t>
             </a:r>
           </a:p>
           <a:p>
@@ -17741,7 +17865,7 @@
               <a:defRPr sz="1800"/>
             </a:pPr>
             <a:r>
-              <a:t>Security &amp; Surveillance</a:t>
+              <a:t>Dense Captions</a:t>
             </a:r>
           </a:p>
           <a:p>
@@ -17749,44 +17873,28 @@
               <a:defRPr sz="1800"/>
             </a:pPr>
             <a:r>
-              <a:t>- Object detection in security feeds</a:t>
+              <a:t>Multiple captions for different regions of an image</a:t>
             </a:r>
           </a:p>
           <a:p>
             <a:pPr>
               <a:defRPr sz="1800"/>
             </a:pPr>
-            <a:r>
-              <a:t>- License plate recognition</a:t>
-            </a:r>
           </a:p>
           <a:p>
             <a:pPr>
               <a:defRPr sz="1800"/>
             </a:pPr>
+            <a:r>
+              <a:t>People Detection</a:t>
+            </a:r>
           </a:p>
           <a:p>
             <a:pPr>
               <a:defRPr sz="1800"/>
             </a:pPr>
             <a:r>
-              <a:t>Social Media</a:t>
-            </a:r>
-          </a:p>
-          <a:p>
-            <a:pPr>
-              <a:defRPr sz="1800"/>
-            </a:pPr>
-            <a:r>
-              <a:t>- Content moderation</a:t>
-            </a:r>
-          </a:p>
-          <a:p>
-            <a:pPr>
-              <a:defRPr sz="1800"/>
-            </a:pPr>
-            <a:r>
-              <a:t>- Auto-tagging photos</a:t>
+              <a:t>Detect people and their positions in photos</a:t>
             </a:r>
           </a:p>
         </p:txBody>
@@ -17825,7 +17933,7 @@
           <a:lstStyle/>
           <a:p>
             <a:r>
-              <a:t>What We'll Build</a:t>
+              <a:t>Real-World Use Cases</a:t>
             </a:r>
           </a:p>
         </p:txBody>
@@ -17849,36 +17957,36 @@
               <a:defRPr sz="1800"/>
             </a:pPr>
             <a:r>
-              <a:t>A Streamlit web app that:</a:t>
+              <a:t>Accessibility</a:t>
             </a:r>
           </a:p>
           <a:p>
             <a:pPr>
               <a:defRPr sz="1800"/>
             </a:pPr>
+            <a:r>
+              <a:t>- Screen readers describing images for visually impaired users</a:t>
+            </a:r>
           </a:p>
           <a:p>
             <a:pPr>
               <a:defRPr sz="1800"/>
             </a:pPr>
             <a:r>
-              <a:t>1. Accepts image upload or URL</a:t>
+              <a:t>- Alt-text generation for websites</a:t>
             </a:r>
           </a:p>
           <a:p>
             <a:pPr>
               <a:defRPr sz="1800"/>
             </a:pPr>
-            <a:r>
-              <a:t>2. Sends image to Azure AI Vision API</a:t>
-            </a:r>
           </a:p>
           <a:p>
             <a:pPr>
               <a:defRPr sz="1800"/>
             </a:pPr>
             <a:r>
-              <a:t>3. Displays results:</a:t>
+              <a:t>Retail &amp; E-commerce</a:t>
             </a:r>
           </a:p>
           <a:p>
@@ -17886,7 +17994,7 @@
               <a:defRPr sz="1800"/>
             </a:pPr>
             <a:r>
-              <a:t>   - Generated caption</a:t>
+              <a:t>- Product image tagging</a:t>
             </a:r>
           </a:p>
           <a:p>
@@ -17894,52 +18002,49 @@
               <a:defRPr sz="1800"/>
             </a:pPr>
             <a:r>
-              <a:t>   - Detected objects with bounding boxes</a:t>
+              <a:t>- Visual search ("find similar items")</a:t>
             </a:r>
           </a:p>
           <a:p>
             <a:pPr>
               <a:defRPr sz="1800"/>
             </a:pPr>
-            <a:r>
-              <a:t>   - Extracted text (OCR)</a:t>
-            </a:r>
           </a:p>
           <a:p>
             <a:pPr>
               <a:defRPr sz="1800"/>
             </a:pPr>
             <a:r>
-              <a:t>   - Smart tags</a:t>
+              <a:t>Document Processing</a:t>
             </a:r>
           </a:p>
           <a:p>
             <a:pPr>
               <a:defRPr sz="1800"/>
             </a:pPr>
+            <a:r>
+              <a:t>- Digitize paper documents</a:t>
+            </a:r>
           </a:p>
           <a:p>
             <a:pPr>
               <a:defRPr sz="1800"/>
             </a:pPr>
             <a:r>
-              <a:t>Tech Stack:</a:t>
+              <a:t>- Extract data from forms and receipts</a:t>
             </a:r>
           </a:p>
           <a:p>
             <a:pPr>
               <a:defRPr sz="1800"/>
             </a:pPr>
-            <a:r>
-              <a:t>- Python 3.10+</a:t>
-            </a:r>
           </a:p>
           <a:p>
             <a:pPr>
               <a:defRPr sz="1800"/>
             </a:pPr>
             <a:r>
-              <a:t>- Streamlit (Web UI)</a:t>
+              <a:t>Security &amp; Surveillance</a:t>
             </a:r>
           </a:p>
           <a:p>
@@ -17947,7 +18052,7 @@
               <a:defRPr sz="1800"/>
             </a:pPr>
             <a:r>
-              <a:t>- Azure AI Vision SDK</a:t>
+              <a:t>- Object detection in security feeds</a:t>
             </a:r>
           </a:p>
           <a:p>
@@ -17955,7 +18060,36 @@
               <a:defRPr sz="1800"/>
             </a:pPr>
             <a:r>
-              <a:t>- ~50 lines of code!</a:t>
+              <a:t>- License plate recognition</a:t>
+            </a:r>
+          </a:p>
+          <a:p>
+            <a:pPr>
+              <a:defRPr sz="1800"/>
+            </a:pPr>
+          </a:p>
+          <a:p>
+            <a:pPr>
+              <a:defRPr sz="1800"/>
+            </a:pPr>
+            <a:r>
+              <a:t>Social Media</a:t>
+            </a:r>
+          </a:p>
+          <a:p>
+            <a:pPr>
+              <a:defRPr sz="1800"/>
+            </a:pPr>
+            <a:r>
+              <a:t>- Content moderation</a:t>
+            </a:r>
+          </a:p>
+          <a:p>
+            <a:pPr>
+              <a:defRPr sz="1800"/>
+            </a:pPr>
+            <a:r>
+              <a:t>- Auto-tagging photos</a:t>
             </a:r>
           </a:p>
         </p:txBody>
@@ -17994,7 +18128,7 @@
           <a:lstStyle/>
           <a:p>
             <a:r>
-              <a:t>Demo</a:t>
+              <a:t>What We'll Build</a:t>
             </a:r>
           </a:p>
         </p:txBody>
@@ -18006,7 +18140,7 @@
             <a:spLocks noGrp="1"/>
           </p:cNvSpPr>
           <p:nvPr>
-            <p:ph type="body" idx="12" sz="quarter"/>
+            <p:ph type="body" idx="10" sz="quarter"/>
           </p:nvPr>
         </p:nvSpPr>
         <p:spPr/>
@@ -18014,8 +18148,117 @@
           <a:bodyPr/>
           <a:lstStyle/>
           <a:p>
-            <a:r>
-              <a:t>Let's build it live!</a:t>
+            <a:pPr>
+              <a:defRPr sz="1800"/>
+            </a:pPr>
+            <a:r>
+              <a:t>A Streamlit web app that:</a:t>
+            </a:r>
+          </a:p>
+          <a:p>
+            <a:pPr>
+              <a:defRPr sz="1800"/>
+            </a:pPr>
+          </a:p>
+          <a:p>
+            <a:pPr>
+              <a:defRPr sz="1800"/>
+            </a:pPr>
+            <a:r>
+              <a:t>1. Accepts image upload or URL</a:t>
+            </a:r>
+          </a:p>
+          <a:p>
+            <a:pPr>
+              <a:defRPr sz="1800"/>
+            </a:pPr>
+            <a:r>
+              <a:t>2. Sends image to Azure AI Vision API</a:t>
+            </a:r>
+          </a:p>
+          <a:p>
+            <a:pPr>
+              <a:defRPr sz="1800"/>
+            </a:pPr>
+            <a:r>
+              <a:t>3. Displays results:</a:t>
+            </a:r>
+          </a:p>
+          <a:p>
+            <a:pPr>
+              <a:defRPr sz="1800"/>
+            </a:pPr>
+            <a:r>
+              <a:t>   - Generated caption</a:t>
+            </a:r>
+          </a:p>
+          <a:p>
+            <a:pPr>
+              <a:defRPr sz="1800"/>
+            </a:pPr>
+            <a:r>
+              <a:t>   - Detected objects with bounding boxes</a:t>
+            </a:r>
+          </a:p>
+          <a:p>
+            <a:pPr>
+              <a:defRPr sz="1800"/>
+            </a:pPr>
+            <a:r>
+              <a:t>   - Extracted text (OCR)</a:t>
+            </a:r>
+          </a:p>
+          <a:p>
+            <a:pPr>
+              <a:defRPr sz="1800"/>
+            </a:pPr>
+            <a:r>
+              <a:t>   - Smart tags</a:t>
+            </a:r>
+          </a:p>
+          <a:p>
+            <a:pPr>
+              <a:defRPr sz="1800"/>
+            </a:pPr>
+          </a:p>
+          <a:p>
+            <a:pPr>
+              <a:defRPr sz="1800"/>
+            </a:pPr>
+            <a:r>
+              <a:t>Tech Stack:</a:t>
+            </a:r>
+          </a:p>
+          <a:p>
+            <a:pPr>
+              <a:defRPr sz="1800"/>
+            </a:pPr>
+            <a:r>
+              <a:t>- Python 3.10+</a:t>
+            </a:r>
+          </a:p>
+          <a:p>
+            <a:pPr>
+              <a:defRPr sz="1800"/>
+            </a:pPr>
+            <a:r>
+              <a:t>- Streamlit (Web UI)</a:t>
+            </a:r>
+          </a:p>
+          <a:p>
+            <a:pPr>
+              <a:defRPr sz="1800"/>
+            </a:pPr>
+            <a:r>
+              <a:t>- Azure AI Vision SDK</a:t>
+            </a:r>
+          </a:p>
+          <a:p>
+            <a:pPr>
+              <a:defRPr sz="1800"/>
+            </a:pPr>
+            <a:r>
+              <a:t>- ~50 lines of code!</a:t>
             </a:r>
           </a:p>
         </p:txBody>
@@ -18054,7 +18297,7 @@
           <a:lstStyle/>
           <a:p>
             <a:r>
-              <a:t>Resources &amp; Next Steps</a:t>
+              <a:t>Demo</a:t>
             </a:r>
           </a:p>
         </p:txBody>
@@ -18066,7 +18309,7 @@
             <a:spLocks noGrp="1"/>
           </p:cNvSpPr>
           <p:nvPr>
-            <p:ph type="body" idx="10" sz="quarter"/>
+            <p:ph type="body" idx="12" sz="quarter"/>
           </p:nvPr>
         </p:nvSpPr>
         <p:spPr/>
@@ -18074,103 +18317,8 @@
           <a:bodyPr/>
           <a:lstStyle/>
           <a:p>
-            <a:pPr>
-              <a:defRPr sz="1800"/>
-            </a:pPr>
-            <a:r>
-              <a:t>Official Documentation</a:t>
-            </a:r>
-          </a:p>
-          <a:p>
-            <a:pPr>
-              <a:defRPr sz="1800"/>
-            </a:pPr>
-            <a:r>
-              <a:t>learn.microsoft.com/azure/ai-services/computer-vision/</a:t>
-            </a:r>
-          </a:p>
-          <a:p>
-            <a:pPr>
-              <a:defRPr sz="1800"/>
-            </a:pPr>
-          </a:p>
-          <a:p>
-            <a:pPr>
-              <a:defRPr sz="1800"/>
-            </a:pPr>
-            <a:r>
-              <a:t>Microsoft Learn Path</a:t>
-            </a:r>
-          </a:p>
-          <a:p>
-            <a:pPr>
-              <a:defRPr sz="1800"/>
-            </a:pPr>
-            <a:r>
-              <a:t>learn.microsoft.com/training/paths/create-computer-vision-solutions-azure-ai/</a:t>
-            </a:r>
-          </a:p>
-          <a:p>
-            <a:pPr>
-              <a:defRPr sz="1800"/>
-            </a:pPr>
-          </a:p>
-          <a:p>
-            <a:pPr>
-              <a:defRPr sz="1800"/>
-            </a:pPr>
-            <a:r>
-              <a:t>Certifications</a:t>
-            </a:r>
-          </a:p>
-          <a:p>
-            <a:pPr>
-              <a:defRPr sz="1800"/>
-            </a:pPr>
-            <a:r>
-              <a:t>- AI-102: Azure AI Engineer Associate</a:t>
-            </a:r>
-          </a:p>
-          <a:p>
-            <a:pPr>
-              <a:defRPr sz="1800"/>
-            </a:pPr>
-            <a:r>
-              <a:t>- AI-900: Azure AI Fundamentals</a:t>
-            </a:r>
-          </a:p>
-          <a:p>
-            <a:pPr>
-              <a:defRPr sz="1800"/>
-            </a:pPr>
-          </a:p>
-          <a:p>
-            <a:pPr>
-              <a:defRPr sz="1800"/>
-            </a:pPr>
-            <a:r>
-              <a:t>Code from Today</a:t>
-            </a:r>
-          </a:p>
-          <a:p>
-            <a:pPr>
-              <a:defRPr sz="1800"/>
-            </a:pPr>
-            <a:r>
-              <a:t>github.com/[your-repo]</a:t>
-            </a:r>
-          </a:p>
-          <a:p>
-            <a:pPr>
-              <a:defRPr sz="1800"/>
-            </a:pPr>
-          </a:p>
-          <a:p>
-            <a:pPr>
-              <a:defRPr sz="1800"/>
-            </a:pPr>
-            <a:r>
-              <a:t>Questions? Let's connect!</a:t>
+            <a:r>
+              <a:t>Let's build it live!</a:t>
             </a:r>
           </a:p>
         </p:txBody>

</xml_diff>

<commit_message>
Fix slide content overflow - split dense slides
- Each slide now has max 5-6 bullet points
- Split "Use Cases" into Accessibility + Business slides
- Split "What We'll Build" into separate slides
- Split "Resources" into Resources + Certifications
- Added "Connect With Me" slide

🤖 Generated with [Claude Code](https://claude.com/claude-code)

Co-Authored-By: Claude Opus 4.5 <noreply@anthropic.com>
</commit_message>
<xml_diff>
--- a/Azure_AI_Vision_Workshop.pptx
+++ b/Azure_AI_Vision_Workshop.pptx
@@ -24,6 +24,11 @@
     <p:sldId id="1871" r:id="rId23"/>
     <p:sldId id="1872" r:id="rId14"/>
     <p:sldId id="1873" r:id="rId13"/>
+    <p:sldId id="1874" r:id="rId12"/>
+    <p:sldId id="1875" r:id="rId11"/>
+    <p:sldId id="1876" r:id="rId10"/>
+    <p:sldId id="1877" r:id="rId9"/>
+    <p:sldId id="1878" r:id="rId8"/>
   </p:sldIdLst>
   <p:sldSz cx="12192000" cy="6858000"/>
   <p:notesSz cx="6858000" cy="9144000"/>
@@ -17016,11 +17021,8 @@
           <a:bodyPr/>
           <a:lstStyle/>
           <a:p>
-            <a:pPr>
-              <a:defRPr b="1"/>
-            </a:pPr>
-            <a:r>
-              <a:t>Resources &amp; Next Steps</a:t>
+            <a:r>
+              <a:t>What We'll Build</a:t>
             </a:r>
           </a:p>
         </p:txBody>
@@ -17042,183 +17044,106 @@
           <a:p>
             <a:pPr>
               <a:spcBef>
-                <a:spcPts val="1800"/>
+                <a:spcPts val="1200"/>
               </a:spcBef>
               <a:spcAft>
-                <a:spcPts val="600"/>
+                <a:spcPts val="400"/>
               </a:spcAft>
-              <a:defRPr b="1" sz="2000"/>
+              <a:defRPr b="1" sz="2200"/>
             </a:pPr>
             <a:r>
-              <a:t>Official Documentation:</a:t>
-            </a:r>
+              <a:t>A Streamlit web app:</a:t>
+            </a:r>
+          </a:p>
+          <a:p>
+            <a:pPr>
+              <a:spcAft>
+                <a:spcPts val="800"/>
+              </a:spcAft>
+            </a:pPr>
           </a:p>
           <a:p>
             <a:pPr>
               <a:spcBef>
-                <a:spcPts val="600"/>
+                <a:spcPts val="400"/>
               </a:spcBef>
               <a:spcAft>
-                <a:spcPts val="600"/>
+                <a:spcPts val="400"/>
               </a:spcAft>
-              <a:defRPr sz="1800"/>
+              <a:defRPr sz="2000"/>
             </a:pPr>
             <a:r>
-              <a:t>• learn.microsoft.com/azure/ai-services/computer-vision/</a:t>
-            </a:r>
-          </a:p>
-          <a:p>
-            <a:pPr>
-              <a:spcAft>
-                <a:spcPts val="1200"/>
-              </a:spcAft>
-            </a:pPr>
+              <a:t>1. Upload image or paste URL</a:t>
+            </a:r>
           </a:p>
           <a:p>
             <a:pPr>
               <a:spcBef>
-                <a:spcPts val="1800"/>
+                <a:spcPts val="400"/>
               </a:spcBef>
               <a:spcAft>
-                <a:spcPts val="600"/>
+                <a:spcPts val="400"/>
               </a:spcAft>
-              <a:defRPr b="1" sz="2000"/>
+              <a:defRPr sz="2000"/>
             </a:pPr>
             <a:r>
-              <a:t>Microsoft Learn Path:</a:t>
+              <a:t>2. Send to Azure AI Vision API</a:t>
             </a:r>
           </a:p>
           <a:p>
             <a:pPr>
               <a:spcBef>
-                <a:spcPts val="600"/>
+                <a:spcPts val="1200"/>
               </a:spcBef>
               <a:spcAft>
-                <a:spcPts val="600"/>
+                <a:spcPts val="400"/>
               </a:spcAft>
-              <a:defRPr sz="1800"/>
+              <a:defRPr b="1" sz="2200"/>
             </a:pPr>
             <a:r>
-              <a:t>• learn.microsoft.com/training/paths/create-computer-vision-solutions-azure-ai/</a:t>
-            </a:r>
-          </a:p>
-          <a:p>
-            <a:pPr>
-              <a:spcAft>
-                <a:spcPts val="1200"/>
-              </a:spcAft>
-            </a:pPr>
+              <a:t>3. Display results:</a:t>
+            </a:r>
           </a:p>
           <a:p>
             <a:pPr>
               <a:spcBef>
-                <a:spcPts val="1800"/>
+                <a:spcPts val="400"/>
               </a:spcBef>
               <a:spcAft>
-                <a:spcPts val="600"/>
+                <a:spcPts val="400"/>
               </a:spcAft>
-              <a:defRPr b="1" sz="2000"/>
+              <a:defRPr sz="2000"/>
             </a:pPr>
             <a:r>
-              <a:t>Certifications:</a:t>
+              <a:t>• Caption</a:t>
             </a:r>
           </a:p>
           <a:p>
             <a:pPr>
               <a:spcBef>
-                <a:spcPts val="600"/>
+                <a:spcPts val="400"/>
               </a:spcBef>
               <a:spcAft>
-                <a:spcPts val="600"/>
+                <a:spcPts val="400"/>
               </a:spcAft>
-              <a:defRPr sz="1800"/>
+              <a:defRPr sz="2000"/>
             </a:pPr>
             <a:r>
-              <a:t>• AI-102: Azure AI Engineer Associate</a:t>
+              <a:t>• Objects detected</a:t>
             </a:r>
           </a:p>
           <a:p>
             <a:pPr>
               <a:spcBef>
-                <a:spcPts val="600"/>
+                <a:spcPts val="400"/>
               </a:spcBef>
               <a:spcAft>
-                <a:spcPts val="600"/>
+                <a:spcPts val="400"/>
               </a:spcAft>
-              <a:defRPr sz="1800"/>
+              <a:defRPr sz="2000"/>
             </a:pPr>
             <a:r>
-              <a:t>• AI-900: Azure AI Fundamentals</a:t>
-            </a:r>
-          </a:p>
-          <a:p>
-            <a:pPr>
-              <a:spcAft>
-                <a:spcPts val="1200"/>
-              </a:spcAft>
-            </a:pPr>
-          </a:p>
-          <a:p>
-            <a:pPr>
-              <a:spcBef>
-                <a:spcPts val="1800"/>
-              </a:spcBef>
-              <a:spcAft>
-                <a:spcPts val="600"/>
-              </a:spcAft>
-              <a:defRPr b="1" sz="2000"/>
-            </a:pPr>
-            <a:r>
-              <a:t>Code from Today:</a:t>
-            </a:r>
-          </a:p>
-          <a:p>
-            <a:pPr>
-              <a:spcBef>
-                <a:spcPts val="600"/>
-              </a:spcBef>
-              <a:spcAft>
-                <a:spcPts val="600"/>
-              </a:spcAft>
-              <a:defRPr sz="1800"/>
-            </a:pPr>
-            <a:r>
-              <a:t>• github.com/jainal09/azure-ai-vision-workshop</a:t>
-            </a:r>
-          </a:p>
-          <a:p>
-            <a:pPr>
-              <a:spcAft>
-                <a:spcPts val="1200"/>
-              </a:spcAft>
-            </a:pPr>
-          </a:p>
-          <a:p>
-            <a:pPr>
-              <a:spcBef>
-                <a:spcPts val="1800"/>
-              </a:spcBef>
-              <a:spcAft>
-                <a:spcPts val="600"/>
-              </a:spcAft>
-              <a:defRPr b="1" sz="2000"/>
-            </a:pPr>
-            <a:r>
-              <a:t>Connect with Me:</a:t>
-            </a:r>
-          </a:p>
-          <a:p>
-            <a:pPr>
-              <a:spcBef>
-                <a:spcPts val="600"/>
-              </a:spcBef>
-              <a:spcAft>
-                <a:spcPts val="600"/>
-              </a:spcAft>
-              <a:defRPr sz="1800"/>
-            </a:pPr>
-            <a:r>
-              <a:t>• linkedin.com/in/jainal-gosaliya</a:t>
+              <a:t>• Extracted text (OCR)</a:t>
             </a:r>
           </a:p>
         </p:txBody>
@@ -17256,11 +17181,101 @@
           <a:bodyPr/>
           <a:lstStyle/>
           <a:p>
+            <a:r>
+              <a:t>Tech Stack</a:t>
+            </a:r>
+          </a:p>
+        </p:txBody>
+      </p:sp>
+      <p:sp>
+        <p:nvSpPr>
+          <p:cNvPr id="3" name="Text Placeholder 2"/>
+          <p:cNvSpPr>
+            <a:spLocks noGrp="1"/>
+          </p:cNvSpPr>
+          <p:nvPr>
+            <p:ph type="body" idx="10" sz="quarter"/>
+          </p:nvPr>
+        </p:nvSpPr>
+        <p:spPr/>
+        <p:txBody>
+          <a:bodyPr/>
+          <a:lstStyle/>
+          <a:p>
             <a:pPr>
-              <a:defRPr b="1"/>
+              <a:spcBef>
+                <a:spcPts val="1200"/>
+              </a:spcBef>
+              <a:spcAft>
+                <a:spcPts val="400"/>
+              </a:spcAft>
+              <a:defRPr b="1" sz="2200"/>
             </a:pPr>
             <a:r>
-              <a:t>Q&amp;A</a:t>
+              <a:t>Simple &amp; Powerful:</a:t>
+            </a:r>
+          </a:p>
+          <a:p>
+            <a:pPr>
+              <a:spcAft>
+                <a:spcPts val="800"/>
+              </a:spcAft>
+            </a:pPr>
+          </a:p>
+          <a:p>
+            <a:pPr>
+              <a:spcBef>
+                <a:spcPts val="400"/>
+              </a:spcBef>
+              <a:spcAft>
+                <a:spcPts val="400"/>
+              </a:spcAft>
+              <a:defRPr sz="2000"/>
+            </a:pPr>
+            <a:r>
+              <a:t>• Python 3.10+</a:t>
+            </a:r>
+          </a:p>
+          <a:p>
+            <a:pPr>
+              <a:spcBef>
+                <a:spcPts val="400"/>
+              </a:spcBef>
+              <a:spcAft>
+                <a:spcPts val="400"/>
+              </a:spcAft>
+              <a:defRPr sz="2000"/>
+            </a:pPr>
+            <a:r>
+              <a:t>• Streamlit (Web UI)</a:t>
+            </a:r>
+          </a:p>
+          <a:p>
+            <a:pPr>
+              <a:spcBef>
+                <a:spcPts val="400"/>
+              </a:spcBef>
+              <a:spcAft>
+                <a:spcPts val="400"/>
+              </a:spcAft>
+              <a:defRPr sz="2000"/>
+            </a:pPr>
+            <a:r>
+              <a:t>• Azure AI Vision REST API</a:t>
+            </a:r>
+          </a:p>
+          <a:p>
+            <a:pPr>
+              <a:spcBef>
+                <a:spcPts val="400"/>
+              </a:spcBef>
+              <a:spcAft>
+                <a:spcPts val="400"/>
+              </a:spcAft>
+              <a:defRPr sz="2000"/>
+            </a:pPr>
+            <a:r>
+              <a:t>• About 50 lines of code!</a:t>
             </a:r>
           </a:p>
         </p:txBody>
@@ -17298,9 +17313,525 @@
           <a:bodyPr/>
           <a:lstStyle/>
           <a:p>
+            <a:r>
+              <a:t>Demo Time!</a:t>
+            </a:r>
+          </a:p>
+        </p:txBody>
+      </p:sp>
+      <p:sp>
+        <p:nvSpPr>
+          <p:cNvPr id="3" name="Text Placeholder 2"/>
+          <p:cNvSpPr>
+            <a:spLocks noGrp="1"/>
+          </p:cNvSpPr>
+          <p:nvPr>
+            <p:ph type="body" idx="12" sz="quarter"/>
+          </p:nvPr>
+        </p:nvSpPr>
+        <p:spPr/>
+        <p:txBody>
+          <a:bodyPr/>
+          <a:lstStyle/>
+          <a:p>
             <a:pPr>
-              <a:defRPr b="1"/>
+              <a:defRPr sz="2800"/>
             </a:pPr>
+            <a:r>
+              <a:t>Let's build it live!</a:t>
+            </a:r>
+          </a:p>
+        </p:txBody>
+      </p:sp>
+    </p:spTree>
+  </p:cSld>
+  <p:clrMapOvr>
+    <a:masterClrMapping/>
+  </p:clrMapOvr>
+</p:sld>
+</file>
+
+<file path=ppt/slides/slide13.xml><?xml version="1.0" encoding="utf-8"?>
+<p:sld xmlns:a="http://schemas.openxmlformats.org/drawingml/2006/main" xmlns:p="http://schemas.openxmlformats.org/presentationml/2006/main" xmlns:r="http://schemas.openxmlformats.org/officeDocument/2006/relationships">
+  <p:cSld>
+    <p:spTree>
+      <p:nvGrpSpPr>
+        <p:cNvPr id="1" name=""/>
+        <p:cNvGrpSpPr/>
+        <p:nvPr/>
+      </p:nvGrpSpPr>
+      <p:grpSpPr/>
+      <p:sp>
+        <p:nvSpPr>
+          <p:cNvPr id="2" name="Title 1"/>
+          <p:cNvSpPr>
+            <a:spLocks noGrp="1"/>
+          </p:cNvSpPr>
+          <p:nvPr>
+            <p:ph type="title"/>
+          </p:nvPr>
+        </p:nvSpPr>
+        <p:spPr/>
+        <p:txBody>
+          <a:bodyPr/>
+          <a:lstStyle/>
+          <a:p>
+            <a:r>
+              <a:t>Resources</a:t>
+            </a:r>
+          </a:p>
+        </p:txBody>
+      </p:sp>
+      <p:sp>
+        <p:nvSpPr>
+          <p:cNvPr id="3" name="Text Placeholder 2"/>
+          <p:cNvSpPr>
+            <a:spLocks noGrp="1"/>
+          </p:cNvSpPr>
+          <p:nvPr>
+            <p:ph type="body" idx="10" sz="quarter"/>
+          </p:nvPr>
+        </p:nvSpPr>
+        <p:spPr/>
+        <p:txBody>
+          <a:bodyPr/>
+          <a:lstStyle/>
+          <a:p>
+            <a:pPr>
+              <a:spcBef>
+                <a:spcPts val="1200"/>
+              </a:spcBef>
+              <a:spcAft>
+                <a:spcPts val="400"/>
+              </a:spcAft>
+              <a:defRPr b="1" sz="2200"/>
+            </a:pPr>
+            <a:r>
+              <a:t>Documentation:</a:t>
+            </a:r>
+          </a:p>
+          <a:p>
+            <a:pPr>
+              <a:spcBef>
+                <a:spcPts val="400"/>
+              </a:spcBef>
+              <a:spcAft>
+                <a:spcPts val="400"/>
+              </a:spcAft>
+              <a:defRPr sz="2000"/>
+            </a:pPr>
+            <a:r>
+              <a:t>• learn.microsoft.com/azure/ai-services/computer-vision/</a:t>
+            </a:r>
+          </a:p>
+          <a:p>
+            <a:pPr>
+              <a:spcAft>
+                <a:spcPts val="800"/>
+              </a:spcAft>
+            </a:pPr>
+          </a:p>
+          <a:p>
+            <a:pPr>
+              <a:spcBef>
+                <a:spcPts val="1200"/>
+              </a:spcBef>
+              <a:spcAft>
+                <a:spcPts val="400"/>
+              </a:spcAft>
+              <a:defRPr b="1" sz="2200"/>
+            </a:pPr>
+            <a:r>
+              <a:t>Microsoft Learn Path:</a:t>
+            </a:r>
+          </a:p>
+          <a:p>
+            <a:pPr>
+              <a:spcBef>
+                <a:spcPts val="400"/>
+              </a:spcBef>
+              <a:spcAft>
+                <a:spcPts val="400"/>
+              </a:spcAft>
+              <a:defRPr sz="2000"/>
+            </a:pPr>
+            <a:r>
+              <a:t>• Azure AI Vision learning path</a:t>
+            </a:r>
+          </a:p>
+          <a:p>
+            <a:pPr>
+              <a:spcAft>
+                <a:spcPts val="800"/>
+              </a:spcAft>
+            </a:pPr>
+          </a:p>
+          <a:p>
+            <a:pPr>
+              <a:spcBef>
+                <a:spcPts val="1200"/>
+              </a:spcBef>
+              <a:spcAft>
+                <a:spcPts val="400"/>
+              </a:spcAft>
+              <a:defRPr b="1" sz="2200"/>
+            </a:pPr>
+            <a:r>
+              <a:t>Code from Today:</a:t>
+            </a:r>
+          </a:p>
+          <a:p>
+            <a:pPr>
+              <a:spcBef>
+                <a:spcPts val="400"/>
+              </a:spcBef>
+              <a:spcAft>
+                <a:spcPts val="400"/>
+              </a:spcAft>
+              <a:defRPr sz="2000"/>
+            </a:pPr>
+            <a:r>
+              <a:t>• github.com/jainal09/azure-ai-vision-workshop</a:t>
+            </a:r>
+          </a:p>
+        </p:txBody>
+      </p:sp>
+    </p:spTree>
+  </p:cSld>
+  <p:clrMapOvr>
+    <a:masterClrMapping/>
+  </p:clrMapOvr>
+</p:sld>
+</file>
+
+<file path=ppt/slides/slide14.xml><?xml version="1.0" encoding="utf-8"?>
+<p:sld xmlns:a="http://schemas.openxmlformats.org/drawingml/2006/main" xmlns:p="http://schemas.openxmlformats.org/presentationml/2006/main" xmlns:r="http://schemas.openxmlformats.org/officeDocument/2006/relationships">
+  <p:cSld>
+    <p:spTree>
+      <p:nvGrpSpPr>
+        <p:cNvPr id="1" name=""/>
+        <p:cNvGrpSpPr/>
+        <p:nvPr/>
+      </p:nvGrpSpPr>
+      <p:grpSpPr/>
+      <p:sp>
+        <p:nvSpPr>
+          <p:cNvPr id="2" name="Title 1"/>
+          <p:cNvSpPr>
+            <a:spLocks noGrp="1"/>
+          </p:cNvSpPr>
+          <p:nvPr>
+            <p:ph type="title"/>
+          </p:nvPr>
+        </p:nvSpPr>
+        <p:spPr/>
+        <p:txBody>
+          <a:bodyPr/>
+          <a:lstStyle/>
+          <a:p>
+            <a:r>
+              <a:t>Certifications</a:t>
+            </a:r>
+          </a:p>
+        </p:txBody>
+      </p:sp>
+      <p:sp>
+        <p:nvSpPr>
+          <p:cNvPr id="3" name="Text Placeholder 2"/>
+          <p:cNvSpPr>
+            <a:spLocks noGrp="1"/>
+          </p:cNvSpPr>
+          <p:nvPr>
+            <p:ph type="body" idx="10" sz="quarter"/>
+          </p:nvPr>
+        </p:nvSpPr>
+        <p:spPr/>
+        <p:txBody>
+          <a:bodyPr/>
+          <a:lstStyle/>
+          <a:p>
+            <a:pPr>
+              <a:spcBef>
+                <a:spcPts val="1200"/>
+              </a:spcBef>
+              <a:spcAft>
+                <a:spcPts val="400"/>
+              </a:spcAft>
+              <a:defRPr b="1" sz="2200"/>
+            </a:pPr>
+            <a:r>
+              <a:t>Continue your journey:</a:t>
+            </a:r>
+          </a:p>
+          <a:p>
+            <a:pPr>
+              <a:spcAft>
+                <a:spcPts val="800"/>
+              </a:spcAft>
+            </a:pPr>
+          </a:p>
+          <a:p>
+            <a:pPr>
+              <a:spcBef>
+                <a:spcPts val="400"/>
+              </a:spcBef>
+              <a:spcAft>
+                <a:spcPts val="400"/>
+              </a:spcAft>
+              <a:defRPr sz="2000"/>
+            </a:pPr>
+            <a:r>
+              <a:t>• AI-900: Azure AI Fundamentals</a:t>
+            </a:r>
+          </a:p>
+          <a:p>
+            <a:pPr>
+              <a:spcBef>
+                <a:spcPts val="400"/>
+              </a:spcBef>
+              <a:spcAft>
+                <a:spcPts val="400"/>
+              </a:spcAft>
+              <a:defRPr sz="2000"/>
+            </a:pPr>
+            <a:r>
+              <a:t>• AI-102: Azure AI Engineer Associate</a:t>
+            </a:r>
+          </a:p>
+          <a:p>
+            <a:pPr>
+              <a:spcAft>
+                <a:spcPts val="800"/>
+              </a:spcAft>
+            </a:pPr>
+          </a:p>
+          <a:p>
+            <a:pPr>
+              <a:spcBef>
+                <a:spcPts val="400"/>
+              </a:spcBef>
+              <a:spcAft>
+                <a:spcPts val="400"/>
+              </a:spcAft>
+              <a:defRPr sz="2000"/>
+            </a:pPr>
+            <a:r>
+              <a:t>Free learning resources on Microsoft Learn!</a:t>
+            </a:r>
+          </a:p>
+        </p:txBody>
+      </p:sp>
+    </p:spTree>
+  </p:cSld>
+  <p:clrMapOvr>
+    <a:masterClrMapping/>
+  </p:clrMapOvr>
+</p:sld>
+</file>
+
+<file path=ppt/slides/slide15.xml><?xml version="1.0" encoding="utf-8"?>
+<p:sld xmlns:a="http://schemas.openxmlformats.org/drawingml/2006/main" xmlns:p="http://schemas.openxmlformats.org/presentationml/2006/main" xmlns:r="http://schemas.openxmlformats.org/officeDocument/2006/relationships">
+  <p:cSld>
+    <p:spTree>
+      <p:nvGrpSpPr>
+        <p:cNvPr id="1" name=""/>
+        <p:cNvGrpSpPr/>
+        <p:nvPr/>
+      </p:nvGrpSpPr>
+      <p:grpSpPr/>
+      <p:sp>
+        <p:nvSpPr>
+          <p:cNvPr id="2" name="Title 1"/>
+          <p:cNvSpPr>
+            <a:spLocks noGrp="1"/>
+          </p:cNvSpPr>
+          <p:nvPr>
+            <p:ph type="title"/>
+          </p:nvPr>
+        </p:nvSpPr>
+        <p:spPr/>
+        <p:txBody>
+          <a:bodyPr/>
+          <a:lstStyle/>
+          <a:p>
+            <a:r>
+              <a:t>Q&amp;A</a:t>
+            </a:r>
+          </a:p>
+        </p:txBody>
+      </p:sp>
+    </p:spTree>
+  </p:cSld>
+  <p:clrMapOvr>
+    <a:masterClrMapping/>
+  </p:clrMapOvr>
+</p:sld>
+</file>
+
+<file path=ppt/slides/slide16.xml><?xml version="1.0" encoding="utf-8"?>
+<p:sld xmlns:a="http://schemas.openxmlformats.org/drawingml/2006/main" xmlns:p="http://schemas.openxmlformats.org/presentationml/2006/main" xmlns:r="http://schemas.openxmlformats.org/officeDocument/2006/relationships">
+  <p:cSld>
+    <p:spTree>
+      <p:nvGrpSpPr>
+        <p:cNvPr id="1" name=""/>
+        <p:cNvGrpSpPr/>
+        <p:nvPr/>
+      </p:nvGrpSpPr>
+      <p:grpSpPr/>
+      <p:sp>
+        <p:nvSpPr>
+          <p:cNvPr id="2" name="Title 1"/>
+          <p:cNvSpPr>
+            <a:spLocks noGrp="1"/>
+          </p:cNvSpPr>
+          <p:nvPr>
+            <p:ph type="title"/>
+          </p:nvPr>
+        </p:nvSpPr>
+        <p:spPr/>
+        <p:txBody>
+          <a:bodyPr/>
+          <a:lstStyle/>
+          <a:p>
+            <a:r>
+              <a:t>Connect With Me</a:t>
+            </a:r>
+          </a:p>
+        </p:txBody>
+      </p:sp>
+      <p:sp>
+        <p:nvSpPr>
+          <p:cNvPr id="3" name="Text Placeholder 2"/>
+          <p:cNvSpPr>
+            <a:spLocks noGrp="1"/>
+          </p:cNvSpPr>
+          <p:nvPr>
+            <p:ph type="body" idx="10" sz="quarter"/>
+          </p:nvPr>
+        </p:nvSpPr>
+        <p:spPr/>
+        <p:txBody>
+          <a:bodyPr/>
+          <a:lstStyle/>
+          <a:p>
+            <a:pPr>
+              <a:spcBef>
+                <a:spcPts val="400"/>
+              </a:spcBef>
+              <a:spcAft>
+                <a:spcPts val="400"/>
+              </a:spcAft>
+              <a:defRPr sz="2000"/>
+            </a:pPr>
+            <a:r>
+              <a:t>Jainal Gosaliya</a:t>
+            </a:r>
+          </a:p>
+          <a:p>
+            <a:pPr>
+              <a:spcAft>
+                <a:spcPts val="800"/>
+              </a:spcAft>
+            </a:pPr>
+          </a:p>
+          <a:p>
+            <a:pPr>
+              <a:spcBef>
+                <a:spcPts val="1200"/>
+              </a:spcBef>
+              <a:spcAft>
+                <a:spcPts val="400"/>
+              </a:spcAft>
+              <a:defRPr b="1" sz="2200"/>
+            </a:pPr>
+            <a:r>
+              <a:t>LinkedIn:</a:t>
+            </a:r>
+          </a:p>
+          <a:p>
+            <a:pPr>
+              <a:spcBef>
+                <a:spcPts val="400"/>
+              </a:spcBef>
+              <a:spcAft>
+                <a:spcPts val="400"/>
+              </a:spcAft>
+              <a:defRPr sz="2000"/>
+            </a:pPr>
+            <a:r>
+              <a:t>• linkedin.com/in/jainal-gosaliya</a:t>
+            </a:r>
+          </a:p>
+          <a:p>
+            <a:pPr>
+              <a:spcAft>
+                <a:spcPts val="800"/>
+              </a:spcAft>
+            </a:pPr>
+          </a:p>
+          <a:p>
+            <a:pPr>
+              <a:spcBef>
+                <a:spcPts val="1200"/>
+              </a:spcBef>
+              <a:spcAft>
+                <a:spcPts val="400"/>
+              </a:spcAft>
+              <a:defRPr b="1" sz="2200"/>
+            </a:pPr>
+            <a:r>
+              <a:t>GitHub:</a:t>
+            </a:r>
+          </a:p>
+          <a:p>
+            <a:pPr>
+              <a:spcBef>
+                <a:spcPts val="400"/>
+              </a:spcBef>
+              <a:spcAft>
+                <a:spcPts val="400"/>
+              </a:spcAft>
+              <a:defRPr sz="2000"/>
+            </a:pPr>
+            <a:r>
+              <a:t>• github.com/jainal09</a:t>
+            </a:r>
+          </a:p>
+        </p:txBody>
+      </p:sp>
+    </p:spTree>
+  </p:cSld>
+  <p:clrMapOvr>
+    <a:masterClrMapping/>
+  </p:clrMapOvr>
+</p:sld>
+</file>
+
+<file path=ppt/slides/slide17.xml><?xml version="1.0" encoding="utf-8"?>
+<p:sld xmlns:a="http://schemas.openxmlformats.org/drawingml/2006/main" xmlns:p="http://schemas.openxmlformats.org/presentationml/2006/main" xmlns:r="http://schemas.openxmlformats.org/officeDocument/2006/relationships">
+  <p:cSld>
+    <p:spTree>
+      <p:nvGrpSpPr>
+        <p:cNvPr id="1" name=""/>
+        <p:cNvGrpSpPr/>
+        <p:nvPr/>
+      </p:nvGrpSpPr>
+      <p:grpSpPr/>
+      <p:sp>
+        <p:nvSpPr>
+          <p:cNvPr id="2" name="Title 1"/>
+          <p:cNvSpPr>
+            <a:spLocks noGrp="1"/>
+          </p:cNvSpPr>
+          <p:nvPr>
+            <p:ph type="title"/>
+          </p:nvPr>
+        </p:nvSpPr>
+        <p:spPr/>
+        <p:txBody>
+          <a:bodyPr/>
+          <a:lstStyle/>
+          <a:p>
             <a:r>
               <a:t>Thank You!</a:t>
             </a:r>
@@ -17340,9 +17871,6 @@
           <a:bodyPr/>
           <a:lstStyle/>
           <a:p>
-            <a:pPr>
-              <a:defRPr b="1"/>
-            </a:pPr>
             <a:r>
               <a:t>Build an AI-Powered Image Analyzer</a:t>
             </a:r>
@@ -17365,7 +17893,7 @@
           <a:lstStyle/>
           <a:p>
             <a:pPr>
-              <a:defRPr sz="2400"/>
+              <a:defRPr sz="2800"/>
             </a:pPr>
             <a:r>
               <a:t>Azure AI Vision Workshop</a:t>
@@ -17406,9 +17934,6 @@
           <a:bodyPr/>
           <a:lstStyle/>
           <a:p>
-            <a:pPr>
-              <a:defRPr b="1"/>
-            </a:pPr>
             <a:r>
               <a:t>About Me</a:t>
             </a:r>
@@ -17432,12 +17957,12 @@
           <a:p>
             <a:pPr>
               <a:spcBef>
-                <a:spcPts val="1400"/>
+                <a:spcPts val="400"/>
               </a:spcBef>
               <a:spcAft>
                 <a:spcPts val="400"/>
               </a:spcAft>
-              <a:defRPr b="1" sz="2200"/>
+              <a:defRPr sz="2000"/>
             </a:pPr>
             <a:r>
               <a:t>Jainal Gosaliya</a:t>
@@ -17446,28 +17971,7 @@
           <a:p>
             <a:pPr>
               <a:spcAft>
-                <a:spcPts val="1200"/>
-              </a:spcAft>
-            </a:pPr>
-          </a:p>
-          <a:p>
-            <a:pPr>
-              <a:spcBef>
-                <a:spcPts val="1400"/>
-              </a:spcBef>
-              <a:spcAft>
-                <a:spcPts val="400"/>
-              </a:spcAft>
-              <a:defRPr b="1" sz="2200"/>
-            </a:pPr>
-            <a:r>
-              <a:t>Beta Microsoft Learn Student Ambassador</a:t>
-            </a:r>
-          </a:p>
-          <a:p>
-            <a:pPr>
-              <a:spcAft>
-                <a:spcPts val="1200"/>
+                <a:spcPts val="800"/>
               </a:spcAft>
             </a:pPr>
           </a:p>
@@ -17479,93 +17983,16 @@
               <a:spcAft>
                 <a:spcPts val="400"/>
               </a:spcAft>
-              <a:defRPr sz="1800"/>
+              <a:defRPr sz="2000"/>
             </a:pPr>
             <a:r>
-              <a:t>Pursuing Masters of Software Engineering Systems</a:t>
-            </a:r>
-          </a:p>
-          <a:p>
-            <a:pPr>
-              <a:spcBef>
-                <a:spcPts val="1400"/>
-              </a:spcBef>
-              <a:spcAft>
-                <a:spcPts val="400"/>
-              </a:spcAft>
-              <a:defRPr b="1" sz="2200"/>
-            </a:pPr>
-            <a:r>
-              <a:t>at Northeastern University</a:t>
+              <a:t>Beta Microsoft Learn Student Ambassador</a:t>
             </a:r>
           </a:p>
           <a:p>
             <a:pPr>
               <a:spcAft>
-                <a:spcPts val="1200"/>
-              </a:spcAft>
-            </a:pPr>
-          </a:p>
-          <a:p>
-            <a:pPr>
-              <a:spcBef>
-                <a:spcPts val="1800"/>
-              </a:spcBef>
-              <a:spcAft>
-                <a:spcPts val="600"/>
-              </a:spcAft>
-              <a:defRPr b="1" sz="2000"/>
-            </a:pPr>
-            <a:r>
-              <a:t>Passionate about:</a:t>
-            </a:r>
-          </a:p>
-          <a:p>
-            <a:pPr>
-              <a:spcBef>
-                <a:spcPts val="600"/>
-              </a:spcBef>
-              <a:spcAft>
-                <a:spcPts val="600"/>
-              </a:spcAft>
-              <a:defRPr sz="1800"/>
-            </a:pPr>
-            <a:r>
-              <a:t>• Python</a:t>
-            </a:r>
-          </a:p>
-          <a:p>
-            <a:pPr>
-              <a:spcBef>
-                <a:spcPts val="600"/>
-              </a:spcBef>
-              <a:spcAft>
-                <a:spcPts val="600"/>
-              </a:spcAft>
-              <a:defRPr sz="1800"/>
-            </a:pPr>
-            <a:r>
-              <a:t>• Artificial Intelligence</a:t>
-            </a:r>
-          </a:p>
-          <a:p>
-            <a:pPr>
-              <a:spcBef>
-                <a:spcPts val="600"/>
-              </a:spcBef>
-              <a:spcAft>
-                <a:spcPts val="600"/>
-              </a:spcAft>
-              <a:defRPr sz="1800"/>
-            </a:pPr>
-            <a:r>
-              <a:t>• Microsoft Azure</a:t>
-            </a:r>
-          </a:p>
-          <a:p>
-            <a:pPr>
-              <a:spcAft>
-                <a:spcPts val="1200"/>
+                <a:spcPts val="800"/>
               </a:spcAft>
             </a:pPr>
           </a:p>
@@ -17577,10 +18004,10 @@
               <a:spcAft>
                 <a:spcPts val="400"/>
               </a:spcAft>
-              <a:defRPr sz="1800"/>
+              <a:defRPr sz="2000"/>
             </a:pPr>
             <a:r>
-              <a:t>linkedin.com/in/jainal-gosaliya</a:t>
+              <a:t>Masters in Software Engineering Systems</a:t>
             </a:r>
           </a:p>
           <a:p>
@@ -17591,10 +18018,31 @@
               <a:spcAft>
                 <a:spcPts val="400"/>
               </a:spcAft>
-              <a:defRPr sz="1800"/>
+              <a:defRPr sz="2000"/>
             </a:pPr>
             <a:r>
-              <a:t>github.com/jainal09</a:t>
+              <a:t>Northeastern University</a:t>
+            </a:r>
+          </a:p>
+          <a:p>
+            <a:pPr>
+              <a:spcAft>
+                <a:spcPts val="800"/>
+              </a:spcAft>
+            </a:pPr>
+          </a:p>
+          <a:p>
+            <a:pPr>
+              <a:spcBef>
+                <a:spcPts val="400"/>
+              </a:spcBef>
+              <a:spcAft>
+                <a:spcPts val="400"/>
+              </a:spcAft>
+              <a:defRPr sz="2000"/>
+            </a:pPr>
+            <a:r>
+              <a:t>Passionate about Python, AI &amp; Azure!</a:t>
             </a:r>
           </a:p>
         </p:txBody>
@@ -17632,9 +18080,6 @@
           <a:bodyPr/>
           <a:lstStyle/>
           <a:p>
-            <a:pPr>
-              <a:defRPr b="1"/>
-            </a:pPr>
             <a:r>
               <a:t>Agenda</a:t>
             </a:r>
@@ -17658,61 +18103,54 @@
           <a:p>
             <a:pPr>
               <a:spcBef>
-                <a:spcPts val="1800"/>
+                <a:spcPts val="1200"/>
               </a:spcBef>
               <a:spcAft>
-                <a:spcPts val="600"/>
+                <a:spcPts val="400"/>
               </a:spcAft>
-              <a:defRPr b="1" sz="2000"/>
+              <a:defRPr b="1" sz="2200"/>
             </a:pPr>
             <a:r>
-              <a:t>What We'll Cover Today:</a:t>
-            </a:r>
-          </a:p>
-          <a:p>
-            <a:pPr>
-              <a:spcAft>
-                <a:spcPts val="1200"/>
-              </a:spcAft>
-            </a:pPr>
+              <a:t>Today's Plan:</a:t>
+            </a:r>
           </a:p>
           <a:p>
             <a:pPr>
               <a:spcBef>
-                <a:spcPts val="600"/>
+                <a:spcPts val="400"/>
               </a:spcBef>
               <a:spcAft>
-                <a:spcPts val="600"/>
+                <a:spcPts val="400"/>
               </a:spcAft>
-              <a:defRPr sz="1800"/>
+              <a:defRPr sz="2000"/>
             </a:pPr>
             <a:r>
-              <a:t>• Introduction to Azure AI Vision</a:t>
+              <a:t>• What is Azure AI Vision?</a:t>
             </a:r>
           </a:p>
           <a:p>
             <a:pPr>
               <a:spcBef>
-                <a:spcPts val="600"/>
+                <a:spcPts val="400"/>
               </a:spcBef>
               <a:spcAft>
-                <a:spcPts val="600"/>
+                <a:spcPts val="400"/>
               </a:spcAft>
-              <a:defRPr sz="1800"/>
+              <a:defRPr sz="2000"/>
             </a:pPr>
             <a:r>
-              <a:t>• Key Features &amp; Capabilities</a:t>
+              <a:t>• Key Features</a:t>
             </a:r>
           </a:p>
           <a:p>
             <a:pPr>
               <a:spcBef>
-                <a:spcPts val="600"/>
+                <a:spcPts val="400"/>
               </a:spcBef>
               <a:spcAft>
-                <a:spcPts val="600"/>
+                <a:spcPts val="400"/>
               </a:spcAft>
-              <a:defRPr sz="1800"/>
+              <a:defRPr sz="2000"/>
             </a:pPr>
             <a:r>
               <a:t>• Real-World Use Cases</a:t>
@@ -17721,106 +18159,29 @@
           <a:p>
             <a:pPr>
               <a:spcBef>
-                <a:spcPts val="600"/>
+                <a:spcPts val="400"/>
               </a:spcBef>
               <a:spcAft>
-                <a:spcPts val="600"/>
+                <a:spcPts val="400"/>
               </a:spcAft>
-              <a:defRPr sz="1800"/>
+              <a:defRPr sz="2000"/>
             </a:pPr>
             <a:r>
-              <a:t>• Live Demo: Build an Image Analyzer</a:t>
+              <a:t>• Live Demo</a:t>
             </a:r>
           </a:p>
           <a:p>
             <a:pPr>
               <a:spcBef>
-                <a:spcPts val="600"/>
+                <a:spcPts val="400"/>
               </a:spcBef>
               <a:spcAft>
-                <a:spcPts val="600"/>
+                <a:spcPts val="400"/>
               </a:spcAft>
-              <a:defRPr sz="1800"/>
+              <a:defRPr sz="2000"/>
             </a:pPr>
             <a:r>
-              <a:t>• Resources &amp; Next Steps</a:t>
-            </a:r>
-          </a:p>
-          <a:p>
-            <a:pPr>
-              <a:spcBef>
-                <a:spcPts val="600"/>
-              </a:spcBef>
-              <a:spcAft>
-                <a:spcPts val="600"/>
-              </a:spcAft>
-              <a:defRPr sz="1800"/>
-            </a:pPr>
-            <a:r>
               <a:t>• Q&amp;A</a:t>
-            </a:r>
-          </a:p>
-          <a:p>
-            <a:pPr>
-              <a:spcAft>
-                <a:spcPts val="1200"/>
-              </a:spcAft>
-            </a:pPr>
-          </a:p>
-          <a:p>
-            <a:pPr>
-              <a:spcBef>
-                <a:spcPts val="1800"/>
-              </a:spcBef>
-              <a:spcAft>
-                <a:spcPts val="600"/>
-              </a:spcAft>
-              <a:defRPr b="1" sz="2000"/>
-            </a:pPr>
-            <a:r>
-              <a:t>By the end, you'll be able to:</a:t>
-            </a:r>
-          </a:p>
-          <a:p>
-            <a:pPr>
-              <a:spcBef>
-                <a:spcPts val="600"/>
-              </a:spcBef>
-              <a:spcAft>
-                <a:spcPts val="600"/>
-              </a:spcAft>
-              <a:defRPr sz="1800"/>
-            </a:pPr>
-            <a:r>
-              <a:t>• Set up Azure AI Vision resource from scratch</a:t>
-            </a:r>
-          </a:p>
-          <a:p>
-            <a:pPr>
-              <a:spcBef>
-                <a:spcPts val="600"/>
-              </a:spcBef>
-              <a:spcAft>
-                <a:spcPts val="600"/>
-              </a:spcAft>
-              <a:defRPr sz="1800"/>
-            </a:pPr>
-            <a:r>
-              <a:t>• Build a working image analyzer application</a:t>
-            </a:r>
-          </a:p>
-          <a:p>
-            <a:pPr>
-              <a:spcBef>
-                <a:spcPts val="600"/>
-              </a:spcBef>
-              <a:spcAft>
-                <a:spcPts val="600"/>
-              </a:spcAft>
-              <a:defRPr sz="1800"/>
-            </a:pPr>
-            <a:r>
-              <a:t>• Extract text, detect objects, and generate captions from images</a:t>
             </a:r>
           </a:p>
         </p:txBody>
@@ -17858,9 +18219,6 @@
           <a:bodyPr/>
           <a:lstStyle/>
           <a:p>
-            <a:pPr>
-              <a:defRPr b="1"/>
-            </a:pPr>
             <a:r>
               <a:t>What is Azure AI Vision?</a:t>
             </a:r>
@@ -17889,16 +18247,16 @@
               <a:spcAft>
                 <a:spcPts val="400"/>
               </a:spcAft>
-              <a:defRPr sz="1800"/>
+              <a:defRPr sz="2000"/>
             </a:pPr>
             <a:r>
-              <a:t>Cloud-based AI service that analyzes images and extracts valuable information</a:t>
+              <a:t>Cloud-based AI for image analysis</a:t>
             </a:r>
           </a:p>
           <a:p>
             <a:pPr>
               <a:spcAft>
-                <a:spcPts val="1200"/>
+                <a:spcPts val="800"/>
               </a:spcAft>
             </a:pPr>
           </a:p>
@@ -17910,144 +18268,32 @@
               <a:spcAft>
                 <a:spcPts val="400"/>
               </a:spcAft>
-              <a:defRPr sz="1800"/>
+              <a:defRPr sz="2000"/>
             </a:pPr>
             <a:r>
-              <a:t>Part of Microsoft Foundry Tools (Azure AI Services)</a:t>
+              <a:t>Part of Microsoft Azure AI Services</a:t>
             </a:r>
           </a:p>
           <a:p>
             <a:pPr>
               <a:spcAft>
-                <a:spcPts val="1200"/>
+                <a:spcPts val="800"/>
               </a:spcAft>
             </a:pPr>
           </a:p>
           <a:p>
             <a:pPr>
               <a:spcBef>
-                <a:spcPts val="1800"/>
+                <a:spcPts val="1200"/>
               </a:spcBef>
               <a:spcAft>
-                <a:spcPts val="600"/>
+                <a:spcPts val="400"/>
               </a:spcAft>
-              <a:defRPr b="1" sz="2000"/>
+              <a:defRPr b="1" sz="2200"/>
             </a:pPr>
             <a:r>
-              <a:t>Key Capabilities:</a:t>
-            </a:r>
-          </a:p>
-          <a:p>
-            <a:pPr>
-              <a:spcBef>
-                <a:spcPts val="600"/>
-              </a:spcBef>
-              <a:spcAft>
-                <a:spcPts val="600"/>
-              </a:spcAft>
-              <a:defRPr sz="1800"/>
-            </a:pPr>
-            <a:r>
-              <a:t>• Read and extract text from images (OCR)</a:t>
-            </a:r>
-          </a:p>
-          <a:p>
-            <a:pPr>
-              <a:spcBef>
-                <a:spcPts val="600"/>
-              </a:spcBef>
-              <a:spcAft>
-                <a:spcPts val="600"/>
-              </a:spcAft>
-              <a:defRPr sz="1800"/>
-            </a:pPr>
-            <a:r>
-              <a:t>• Detect and identify objects in photos</a:t>
-            </a:r>
-          </a:p>
-          <a:p>
-            <a:pPr>
-              <a:spcBef>
-                <a:spcPts val="600"/>
-              </a:spcBef>
-              <a:spcAft>
-                <a:spcPts val="600"/>
-              </a:spcAft>
-              <a:defRPr sz="1800"/>
-            </a:pPr>
-            <a:r>
-              <a:t>• Generate human-like image descriptions</a:t>
-            </a:r>
-          </a:p>
-          <a:p>
-            <a:pPr>
-              <a:spcBef>
-                <a:spcPts val="600"/>
-              </a:spcBef>
-              <a:spcAft>
-                <a:spcPts val="600"/>
-              </a:spcAft>
-              <a:defRPr sz="1800"/>
-            </a:pPr>
-            <a:r>
-              <a:t>• Analyze image content and metadata</a:t>
-            </a:r>
-          </a:p>
-          <a:p>
-            <a:pPr>
-              <a:spcAft>
-                <a:spcPts val="1200"/>
-              </a:spcAft>
-            </a:pPr>
-          </a:p>
-          <a:p>
-            <a:pPr>
-              <a:spcBef>
-                <a:spcPts val="1800"/>
-              </a:spcBef>
-              <a:spcAft>
-                <a:spcPts val="600"/>
-              </a:spcAft>
-              <a:defRPr b="1" sz="2000"/>
-            </a:pPr>
-            <a:r>
-              <a:t>Pricing:</a:t>
-            </a:r>
-          </a:p>
-          <a:p>
-            <a:pPr>
-              <a:spcBef>
-                <a:spcPts val="600"/>
-              </a:spcBef>
-              <a:spcAft>
-                <a:spcPts val="600"/>
-              </a:spcAft>
-              <a:defRPr sz="1800"/>
-            </a:pPr>
-            <a:r>
-              <a:t>• Free tier: 20 calls/min, 5,000 calls/month</a:t>
-            </a:r>
-          </a:p>
-          <a:p>
-            <a:pPr>
-              <a:spcBef>
-                <a:spcPts val="600"/>
-              </a:spcBef>
-              <a:spcAft>
-                <a:spcPts val="600"/>
-              </a:spcAft>
-              <a:defRPr sz="1800"/>
-            </a:pPr>
-            <a:r>
-              <a:t>• Perfect for learning and prototyping!</a:t>
-            </a:r>
-          </a:p>
-          <a:p>
-            <a:pPr>
-              <a:spcAft>
-                <a:spcPts val="1200"/>
-              </a:spcAft>
-            </a:pPr>
+              <a:t>Capabilities:</a:t>
+            </a:r>
           </a:p>
           <a:p>
             <a:pPr>
@@ -18057,10 +18303,52 @@
               <a:spcAft>
                 <a:spcPts val="400"/>
               </a:spcAft>
-              <a:defRPr sz="1800"/>
+              <a:defRPr sz="2000"/>
             </a:pPr>
             <a:r>
-              <a:t>learn.microsoft.com/azure/ai-services/computer-vision/</a:t>
+              <a:t>• Extract text from images (OCR)</a:t>
+            </a:r>
+          </a:p>
+          <a:p>
+            <a:pPr>
+              <a:spcBef>
+                <a:spcPts val="400"/>
+              </a:spcBef>
+              <a:spcAft>
+                <a:spcPts val="400"/>
+              </a:spcAft>
+              <a:defRPr sz="2000"/>
+            </a:pPr>
+            <a:r>
+              <a:t>• Detect objects in photos</a:t>
+            </a:r>
+          </a:p>
+          <a:p>
+            <a:pPr>
+              <a:spcBef>
+                <a:spcPts val="400"/>
+              </a:spcBef>
+              <a:spcAft>
+                <a:spcPts val="400"/>
+              </a:spcAft>
+              <a:defRPr sz="2000"/>
+            </a:pPr>
+            <a:r>
+              <a:t>• Generate image descriptions</a:t>
+            </a:r>
+          </a:p>
+          <a:p>
+            <a:pPr>
+              <a:spcBef>
+                <a:spcPts val="400"/>
+              </a:spcBef>
+              <a:spcAft>
+                <a:spcPts val="400"/>
+              </a:spcAft>
+              <a:defRPr sz="2000"/>
+            </a:pPr>
+            <a:r>
+              <a:t>• Analyze image content</a:t>
             </a:r>
           </a:p>
         </p:txBody>
@@ -18098,11 +18386,8 @@
           <a:bodyPr/>
           <a:lstStyle/>
           <a:p>
-            <a:pPr>
-              <a:defRPr b="1"/>
-            </a:pPr>
-            <a:r>
-              <a:t>Key Features</a:t>
+            <a:r>
+              <a:t>Pricing</a:t>
             </a:r>
           </a:p>
         </p:txBody>
@@ -18124,225 +18409,85 @@
           <a:p>
             <a:pPr>
               <a:spcBef>
-                <a:spcPts val="1800"/>
+                <a:spcPts val="400"/>
               </a:spcBef>
               <a:spcAft>
-                <a:spcPts val="600"/>
+                <a:spcPts val="400"/>
               </a:spcAft>
-              <a:defRPr b="1" sz="2000"/>
+              <a:defRPr sz="2000"/>
             </a:pPr>
             <a:r>
-              <a:t>OCR (Read):</a:t>
-            </a:r>
+              <a:t>Free Tier Available!</a:t>
+            </a:r>
+          </a:p>
+          <a:p>
+            <a:pPr>
+              <a:spcAft>
+                <a:spcPts val="800"/>
+              </a:spcAft>
+            </a:pPr>
           </a:p>
           <a:p>
             <a:pPr>
               <a:spcBef>
-                <a:spcPts val="600"/>
+                <a:spcPts val="400"/>
               </a:spcBef>
               <a:spcAft>
-                <a:spcPts val="600"/>
+                <a:spcPts val="400"/>
               </a:spcAft>
-              <a:defRPr sz="1800"/>
+              <a:defRPr sz="2000"/>
             </a:pPr>
             <a:r>
-              <a:t>• Extract printed &amp; handwritten text</a:t>
+              <a:t>• 20 API calls per minute</a:t>
             </a:r>
           </a:p>
           <a:p>
             <a:pPr>
               <a:spcBef>
-                <a:spcPts val="600"/>
+                <a:spcPts val="400"/>
               </a:spcBef>
               <a:spcAft>
-                <a:spcPts val="600"/>
+                <a:spcPts val="400"/>
               </a:spcAft>
-              <a:defRPr sz="1800"/>
+              <a:defRPr sz="2000"/>
             </a:pPr>
             <a:r>
-              <a:t>• Scan receipts, documents, signs</a:t>
+              <a:t>• 5,000 calls per month</a:t>
+            </a:r>
+          </a:p>
+          <a:p>
+            <a:pPr>
+              <a:spcBef>
+                <a:spcPts val="400"/>
+              </a:spcBef>
+              <a:spcAft>
+                <a:spcPts val="400"/>
+              </a:spcAft>
+              <a:defRPr sz="2000"/>
+            </a:pPr>
+            <a:r>
+              <a:t>• No credit card required</a:t>
             </a:r>
           </a:p>
           <a:p>
             <a:pPr>
               <a:spcAft>
-                <a:spcPts val="1200"/>
+                <a:spcPts val="800"/>
               </a:spcAft>
             </a:pPr>
           </a:p>
           <a:p>
             <a:pPr>
               <a:spcBef>
-                <a:spcPts val="1800"/>
+                <a:spcPts val="400"/>
               </a:spcBef>
               <a:spcAft>
-                <a:spcPts val="600"/>
+                <a:spcPts val="400"/>
               </a:spcAft>
-              <a:defRPr b="1" sz="2000"/>
+              <a:defRPr sz="2000"/>
             </a:pPr>
             <a:r>
-              <a:t>Image Captions:</a:t>
-            </a:r>
-          </a:p>
-          <a:p>
-            <a:pPr>
-              <a:spcBef>
-                <a:spcPts val="600"/>
-              </a:spcBef>
-              <a:spcAft>
-                <a:spcPts val="600"/>
-              </a:spcAft>
-              <a:defRPr sz="1800"/>
-            </a:pPr>
-            <a:r>
-              <a:t>• Generate natural language descriptions</a:t>
-            </a:r>
-          </a:p>
-          <a:p>
-            <a:pPr>
-              <a:spcBef>
-                <a:spcPts val="600"/>
-              </a:spcBef>
-              <a:spcAft>
-                <a:spcPts val="600"/>
-              </a:spcAft>
-              <a:defRPr sz="1800"/>
-            </a:pPr>
-            <a:r>
-              <a:t>• "A dog playing in the park"</a:t>
-            </a:r>
-          </a:p>
-          <a:p>
-            <a:pPr>
-              <a:spcAft>
-                <a:spcPts val="1200"/>
-              </a:spcAft>
-            </a:pPr>
-          </a:p>
-          <a:p>
-            <a:pPr>
-              <a:spcBef>
-                <a:spcPts val="1800"/>
-              </a:spcBef>
-              <a:spcAft>
-                <a:spcPts val="600"/>
-              </a:spcAft>
-              <a:defRPr b="1" sz="2000"/>
-            </a:pPr>
-            <a:r>
-              <a:t>Object Detection:</a:t>
-            </a:r>
-          </a:p>
-          <a:p>
-            <a:pPr>
-              <a:spcBef>
-                <a:spcPts val="600"/>
-              </a:spcBef>
-              <a:spcAft>
-                <a:spcPts val="600"/>
-              </a:spcAft>
-              <a:defRPr sz="1800"/>
-            </a:pPr>
-            <a:r>
-              <a:t>• Identify objects with bounding boxes</a:t>
-            </a:r>
-          </a:p>
-          <a:p>
-            <a:pPr>
-              <a:spcBef>
-                <a:spcPts val="600"/>
-              </a:spcBef>
-              <a:spcAft>
-                <a:spcPts val="600"/>
-              </a:spcAft>
-              <a:defRPr sz="1800"/>
-            </a:pPr>
-            <a:r>
-              <a:t>• Find all cars in a parking lot</a:t>
-            </a:r>
-          </a:p>
-          <a:p>
-            <a:pPr>
-              <a:spcAft>
-                <a:spcPts val="1200"/>
-              </a:spcAft>
-            </a:pPr>
-          </a:p>
-          <a:p>
-            <a:pPr>
-              <a:spcBef>
-                <a:spcPts val="1800"/>
-              </a:spcBef>
-              <a:spcAft>
-                <a:spcPts val="600"/>
-              </a:spcAft>
-              <a:defRPr b="1" sz="2000"/>
-            </a:pPr>
-            <a:r>
-              <a:t>Smart Tags:</a:t>
-            </a:r>
-          </a:p>
-          <a:p>
-            <a:pPr>
-              <a:spcBef>
-                <a:spcPts val="600"/>
-              </a:spcBef>
-              <a:spcAft>
-                <a:spcPts val="600"/>
-              </a:spcAft>
-              <a:defRPr sz="1800"/>
-            </a:pPr>
-            <a:r>
-              <a:t>• Label images with keywords</a:t>
-            </a:r>
-          </a:p>
-          <a:p>
-            <a:pPr>
-              <a:spcBef>
-                <a:spcPts val="600"/>
-              </a:spcBef>
-              <a:spcAft>
-                <a:spcPts val="600"/>
-              </a:spcAft>
-              <a:defRPr sz="1800"/>
-            </a:pPr>
-            <a:r>
-              <a:t>• ["outdoor", "nature", "sunny"]</a:t>
-            </a:r>
-          </a:p>
-          <a:p>
-            <a:pPr>
-              <a:spcAft>
-                <a:spcPts val="1200"/>
-              </a:spcAft>
-            </a:pPr>
-          </a:p>
-          <a:p>
-            <a:pPr>
-              <a:spcBef>
-                <a:spcPts val="1800"/>
-              </a:spcBef>
-              <a:spcAft>
-                <a:spcPts val="600"/>
-              </a:spcAft>
-              <a:defRPr b="1" sz="2000"/>
-            </a:pPr>
-            <a:r>
-              <a:t>Dense Captions:</a:t>
-            </a:r>
-          </a:p>
-          <a:p>
-            <a:pPr>
-              <a:spcBef>
-                <a:spcPts val="600"/>
-              </a:spcBef>
-              <a:spcAft>
-                <a:spcPts val="600"/>
-              </a:spcAft>
-              <a:defRPr sz="1800"/>
-            </a:pPr>
-            <a:r>
-              <a:t>• Multiple captions for different image regions</a:t>
+              <a:t>Perfect for learning &amp; prototyping</a:t>
             </a:r>
           </a:p>
         </p:txBody>
@@ -18380,11 +18525,8 @@
           <a:bodyPr/>
           <a:lstStyle/>
           <a:p>
-            <a:pPr>
-              <a:defRPr b="1"/>
-            </a:pPr>
-            <a:r>
-              <a:t>Real-World Use Cases</a:t>
+            <a:r>
+              <a:t>Key Features</a:t>
             </a:r>
           </a:p>
         </p:txBody>
@@ -18406,239 +18548,134 @@
           <a:p>
             <a:pPr>
               <a:spcBef>
-                <a:spcPts val="1800"/>
+                <a:spcPts val="1200"/>
               </a:spcBef>
               <a:spcAft>
-                <a:spcPts val="600"/>
+                <a:spcPts val="400"/>
               </a:spcAft>
-              <a:defRPr b="1" sz="2000"/>
+              <a:defRPr b="1" sz="2200"/>
             </a:pPr>
             <a:r>
-              <a:t>Accessibility:</a:t>
+              <a:t>OCR (Read):</a:t>
             </a:r>
           </a:p>
           <a:p>
             <a:pPr>
               <a:spcBef>
-                <a:spcPts val="600"/>
+                <a:spcPts val="400"/>
               </a:spcBef>
               <a:spcAft>
-                <a:spcPts val="600"/>
+                <a:spcPts val="400"/>
               </a:spcAft>
-              <a:defRPr sz="1800"/>
+              <a:defRPr sz="2000"/>
             </a:pPr>
             <a:r>
-              <a:t>• Screen readers for visually impaired users</a:t>
-            </a:r>
+              <a:t>• Extract printed &amp; handwritten text</a:t>
+            </a:r>
+          </a:p>
+          <a:p>
+            <a:pPr>
+              <a:spcAft>
+                <a:spcPts val="800"/>
+              </a:spcAft>
+            </a:pPr>
           </a:p>
           <a:p>
             <a:pPr>
               <a:spcBef>
-                <a:spcPts val="600"/>
+                <a:spcPts val="1200"/>
               </a:spcBef>
               <a:spcAft>
-                <a:spcPts val="600"/>
+                <a:spcPts val="400"/>
               </a:spcAft>
-              <a:defRPr sz="1800"/>
+              <a:defRPr b="1" sz="2200"/>
             </a:pPr>
             <a:r>
-              <a:t>• Auto-generate alt-text for websites</a:t>
+              <a:t>Image Captions:</a:t>
+            </a:r>
+          </a:p>
+          <a:p>
+            <a:pPr>
+              <a:spcBef>
+                <a:spcPts val="400"/>
+              </a:spcBef>
+              <a:spcAft>
+                <a:spcPts val="400"/>
+              </a:spcAft>
+              <a:defRPr sz="2000"/>
+            </a:pPr>
+            <a:r>
+              <a:t>• "A dog playing in the park"</a:t>
             </a:r>
           </a:p>
           <a:p>
             <a:pPr>
               <a:spcAft>
-                <a:spcPts val="1200"/>
+                <a:spcPts val="800"/>
               </a:spcAft>
             </a:pPr>
           </a:p>
           <a:p>
             <a:pPr>
               <a:spcBef>
-                <a:spcPts val="1800"/>
+                <a:spcPts val="1200"/>
               </a:spcBef>
               <a:spcAft>
-                <a:spcPts val="600"/>
+                <a:spcPts val="400"/>
               </a:spcAft>
-              <a:defRPr b="1" sz="2000"/>
+              <a:defRPr b="1" sz="2200"/>
             </a:pPr>
             <a:r>
-              <a:t>Retail &amp; E-commerce:</a:t>
+              <a:t>Object Detection:</a:t>
             </a:r>
           </a:p>
           <a:p>
             <a:pPr>
               <a:spcBef>
-                <a:spcPts val="600"/>
+                <a:spcPts val="400"/>
               </a:spcBef>
               <a:spcAft>
-                <a:spcPts val="600"/>
+                <a:spcPts val="400"/>
               </a:spcAft>
-              <a:defRPr sz="1800"/>
+              <a:defRPr sz="2000"/>
             </a:pPr>
             <a:r>
-              <a:t>• Product image tagging</a:t>
-            </a:r>
+              <a:t>• Identify objects with bounding boxes</a:t>
+            </a:r>
+          </a:p>
+          <a:p>
+            <a:pPr>
+              <a:spcAft>
+                <a:spcPts val="800"/>
+              </a:spcAft>
+            </a:pPr>
           </a:p>
           <a:p>
             <a:pPr>
               <a:spcBef>
-                <a:spcPts val="600"/>
+                <a:spcPts val="1200"/>
               </a:spcBef>
               <a:spcAft>
-                <a:spcPts val="600"/>
+                <a:spcPts val="400"/>
               </a:spcAft>
-              <a:defRPr sz="1800"/>
+              <a:defRPr b="1" sz="2200"/>
             </a:pPr>
             <a:r>
-              <a:t>• Visual search ("find similar items")</a:t>
-            </a:r>
-          </a:p>
-          <a:p>
-            <a:pPr>
-              <a:spcAft>
-                <a:spcPts val="1200"/>
-              </a:spcAft>
-            </a:pPr>
+              <a:t>Smart Tags:</a:t>
+            </a:r>
           </a:p>
           <a:p>
             <a:pPr>
               <a:spcBef>
-                <a:spcPts val="1800"/>
+                <a:spcPts val="400"/>
               </a:spcBef>
               <a:spcAft>
-                <a:spcPts val="600"/>
+                <a:spcPts val="400"/>
               </a:spcAft>
-              <a:defRPr b="1" sz="2000"/>
+              <a:defRPr sz="2000"/>
             </a:pPr>
             <a:r>
-              <a:t>Document Processing:</a:t>
-            </a:r>
-          </a:p>
-          <a:p>
-            <a:pPr>
-              <a:spcBef>
-                <a:spcPts val="600"/>
-              </a:spcBef>
-              <a:spcAft>
-                <a:spcPts val="600"/>
-              </a:spcAft>
-              <a:defRPr sz="1800"/>
-            </a:pPr>
-            <a:r>
-              <a:t>• Digitize paper documents</a:t>
-            </a:r>
-          </a:p>
-          <a:p>
-            <a:pPr>
-              <a:spcBef>
-                <a:spcPts val="600"/>
-              </a:spcBef>
-              <a:spcAft>
-                <a:spcPts val="600"/>
-              </a:spcAft>
-              <a:defRPr sz="1800"/>
-            </a:pPr>
-            <a:r>
-              <a:t>• Extract data from forms and receipts</a:t>
-            </a:r>
-          </a:p>
-          <a:p>
-            <a:pPr>
-              <a:spcAft>
-                <a:spcPts val="1200"/>
-              </a:spcAft>
-            </a:pPr>
-          </a:p>
-          <a:p>
-            <a:pPr>
-              <a:spcBef>
-                <a:spcPts val="1800"/>
-              </a:spcBef>
-              <a:spcAft>
-                <a:spcPts val="600"/>
-              </a:spcAft>
-              <a:defRPr b="1" sz="2000"/>
-            </a:pPr>
-            <a:r>
-              <a:t>Security:</a:t>
-            </a:r>
-          </a:p>
-          <a:p>
-            <a:pPr>
-              <a:spcBef>
-                <a:spcPts val="600"/>
-              </a:spcBef>
-              <a:spcAft>
-                <a:spcPts val="600"/>
-              </a:spcAft>
-              <a:defRPr sz="1800"/>
-            </a:pPr>
-            <a:r>
-              <a:t>• Object detection in security feeds</a:t>
-            </a:r>
-          </a:p>
-          <a:p>
-            <a:pPr>
-              <a:spcBef>
-                <a:spcPts val="600"/>
-              </a:spcBef>
-              <a:spcAft>
-                <a:spcPts val="600"/>
-              </a:spcAft>
-              <a:defRPr sz="1800"/>
-            </a:pPr>
-            <a:r>
-              <a:t>• License plate recognition</a:t>
-            </a:r>
-          </a:p>
-          <a:p>
-            <a:pPr>
-              <a:spcAft>
-                <a:spcPts val="1200"/>
-              </a:spcAft>
-            </a:pPr>
-          </a:p>
-          <a:p>
-            <a:pPr>
-              <a:spcBef>
-                <a:spcPts val="1800"/>
-              </a:spcBef>
-              <a:spcAft>
-                <a:spcPts val="600"/>
-              </a:spcAft>
-              <a:defRPr b="1" sz="2000"/>
-            </a:pPr>
-            <a:r>
-              <a:t>Social Media:</a:t>
-            </a:r>
-          </a:p>
-          <a:p>
-            <a:pPr>
-              <a:spcBef>
-                <a:spcPts val="600"/>
-              </a:spcBef>
-              <a:spcAft>
-                <a:spcPts val="600"/>
-              </a:spcAft>
-              <a:defRPr sz="1800"/>
-            </a:pPr>
-            <a:r>
-              <a:t>• Content moderation</a:t>
-            </a:r>
-          </a:p>
-          <a:p>
-            <a:pPr>
-              <a:spcBef>
-                <a:spcPts val="600"/>
-              </a:spcBef>
-              <a:spcAft>
-                <a:spcPts val="600"/>
-              </a:spcAft>
-              <a:defRPr sz="1800"/>
-            </a:pPr>
-            <a:r>
-              <a:t>• Auto-tagging photos</a:t>
+              <a:t>• Auto-label images with keywords</a:t>
             </a:r>
           </a:p>
         </p:txBody>
@@ -18676,11 +18713,8 @@
           <a:bodyPr/>
           <a:lstStyle/>
           <a:p>
-            <a:pPr>
-              <a:defRPr b="1"/>
-            </a:pPr>
-            <a:r>
-              <a:t>What We'll Build</a:t>
+            <a:r>
+              <a:t>Use Cases: Accessibility</a:t>
             </a:r>
           </a:p>
         </p:txBody>
@@ -18702,218 +18736,64 @@
           <a:p>
             <a:pPr>
               <a:spcBef>
-                <a:spcPts val="1800"/>
+                <a:spcPts val="1200"/>
               </a:spcBef>
               <a:spcAft>
-                <a:spcPts val="600"/>
+                <a:spcPts val="400"/>
               </a:spcAft>
-              <a:defRPr b="1" sz="2000"/>
+              <a:defRPr b="1" sz="2200"/>
             </a:pPr>
             <a:r>
-              <a:t>A Streamlit web app that:</a:t>
+              <a:t>Helping visually impaired users:</a:t>
             </a:r>
           </a:p>
           <a:p>
             <a:pPr>
               <a:spcAft>
-                <a:spcPts val="1200"/>
+                <a:spcPts val="800"/>
               </a:spcAft>
             </a:pPr>
           </a:p>
           <a:p>
             <a:pPr>
               <a:spcBef>
-                <a:spcPts val="600"/>
+                <a:spcPts val="400"/>
               </a:spcBef>
               <a:spcAft>
-                <a:spcPts val="600"/>
+                <a:spcPts val="400"/>
               </a:spcAft>
-              <a:defRPr sz="1800"/>
+              <a:defRPr sz="2000"/>
             </a:pPr>
             <a:r>
-              <a:t>• Accepts image upload or URL</a:t>
+              <a:t>• Screen readers describing images</a:t>
             </a:r>
           </a:p>
           <a:p>
             <a:pPr>
               <a:spcBef>
-                <a:spcPts val="600"/>
+                <a:spcPts val="400"/>
               </a:spcBef>
               <a:spcAft>
-                <a:spcPts val="600"/>
+                <a:spcPts val="400"/>
               </a:spcAft>
-              <a:defRPr sz="1800"/>
+              <a:defRPr sz="2000"/>
             </a:pPr>
             <a:r>
-              <a:t>• Sends image to Azure AI Vision API</a:t>
+              <a:t>• Auto-generate alt-text for websites</a:t>
             </a:r>
           </a:p>
           <a:p>
             <a:pPr>
               <a:spcBef>
-                <a:spcPts val="600"/>
+                <a:spcPts val="400"/>
               </a:spcBef>
               <a:spcAft>
-                <a:spcPts val="600"/>
+                <a:spcPts val="400"/>
               </a:spcAft>
-              <a:defRPr sz="1800"/>
+              <a:defRPr sz="2000"/>
             </a:pPr>
             <a:r>
-              <a:t>• Displays AI-powered results</a:t>
-            </a:r>
-          </a:p>
-          <a:p>
-            <a:pPr>
-              <a:spcAft>
-                <a:spcPts val="1200"/>
-              </a:spcAft>
-            </a:pPr>
-          </a:p>
-          <a:p>
-            <a:pPr>
-              <a:spcBef>
-                <a:spcPts val="1800"/>
-              </a:spcBef>
-              <a:spcAft>
-                <a:spcPts val="600"/>
-              </a:spcAft>
-              <a:defRPr b="1" sz="2000"/>
-            </a:pPr>
-            <a:r>
-              <a:t>Features we'll implement:</a:t>
-            </a:r>
-          </a:p>
-          <a:p>
-            <a:pPr>
-              <a:spcBef>
-                <a:spcPts val="600"/>
-              </a:spcBef>
-              <a:spcAft>
-                <a:spcPts val="600"/>
-              </a:spcAft>
-              <a:defRPr sz="1800"/>
-            </a:pPr>
-            <a:r>
-              <a:t>• Generated caption describing the image</a:t>
-            </a:r>
-          </a:p>
-          <a:p>
-            <a:pPr>
-              <a:spcBef>
-                <a:spcPts val="600"/>
-              </a:spcBef>
-              <a:spcAft>
-                <a:spcPts val="600"/>
-              </a:spcAft>
-              <a:defRPr sz="1800"/>
-            </a:pPr>
-            <a:r>
-              <a:t>• Detected objects with bounding boxes</a:t>
-            </a:r>
-          </a:p>
-          <a:p>
-            <a:pPr>
-              <a:spcBef>
-                <a:spcPts val="600"/>
-              </a:spcBef>
-              <a:spcAft>
-                <a:spcPts val="600"/>
-              </a:spcAft>
-              <a:defRPr sz="1800"/>
-            </a:pPr>
-            <a:r>
-              <a:t>• Extracted text (OCR)</a:t>
-            </a:r>
-          </a:p>
-          <a:p>
-            <a:pPr>
-              <a:spcBef>
-                <a:spcPts val="600"/>
-              </a:spcBef>
-              <a:spcAft>
-                <a:spcPts val="600"/>
-              </a:spcAft>
-              <a:defRPr sz="1800"/>
-            </a:pPr>
-            <a:r>
-              <a:t>• Smart tags and keywords</a:t>
-            </a:r>
-          </a:p>
-          <a:p>
-            <a:pPr>
-              <a:spcAft>
-                <a:spcPts val="1200"/>
-              </a:spcAft>
-            </a:pPr>
-          </a:p>
-          <a:p>
-            <a:pPr>
-              <a:spcBef>
-                <a:spcPts val="1800"/>
-              </a:spcBef>
-              <a:spcAft>
-                <a:spcPts val="600"/>
-              </a:spcAft>
-              <a:defRPr b="1" sz="2000"/>
-            </a:pPr>
-            <a:r>
-              <a:t>Tech Stack:</a:t>
-            </a:r>
-          </a:p>
-          <a:p>
-            <a:pPr>
-              <a:spcBef>
-                <a:spcPts val="600"/>
-              </a:spcBef>
-              <a:spcAft>
-                <a:spcPts val="600"/>
-              </a:spcAft>
-              <a:defRPr sz="1800"/>
-            </a:pPr>
-            <a:r>
-              <a:t>• Python 3.10+</a:t>
-            </a:r>
-          </a:p>
-          <a:p>
-            <a:pPr>
-              <a:spcBef>
-                <a:spcPts val="600"/>
-              </a:spcBef>
-              <a:spcAft>
-                <a:spcPts val="600"/>
-              </a:spcAft>
-              <a:defRPr sz="1800"/>
-            </a:pPr>
-            <a:r>
-              <a:t>• Streamlit (Web UI)</a:t>
-            </a:r>
-          </a:p>
-          <a:p>
-            <a:pPr>
-              <a:spcBef>
-                <a:spcPts val="600"/>
-              </a:spcBef>
-              <a:spcAft>
-                <a:spcPts val="600"/>
-              </a:spcAft>
-              <a:defRPr sz="1800"/>
-            </a:pPr>
-            <a:r>
-              <a:t>• Azure AI Vision REST API</a:t>
-            </a:r>
-          </a:p>
-          <a:p>
-            <a:pPr>
-              <a:spcBef>
-                <a:spcPts val="600"/>
-              </a:spcBef>
-              <a:spcAft>
-                <a:spcPts val="600"/>
-              </a:spcAft>
-              <a:defRPr sz="1800"/>
-            </a:pPr>
-            <a:r>
-              <a:t>• About 50 lines of code!</a:t>
+              <a:t>• Make content accessible to everyone</a:t>
             </a:r>
           </a:p>
         </p:txBody>
@@ -18951,11 +18831,8 @@
           <a:bodyPr/>
           <a:lstStyle/>
           <a:p>
-            <a:pPr>
-              <a:defRPr b="1"/>
-            </a:pPr>
-            <a:r>
-              <a:t>Demo Time!</a:t>
+            <a:r>
+              <a:t>Use Cases: Business</a:t>
             </a:r>
           </a:p>
         </p:txBody>
@@ -18967,7 +18844,7 @@
             <a:spLocks noGrp="1"/>
           </p:cNvSpPr>
           <p:nvPr>
-            <p:ph type="body" idx="12" sz="quarter"/>
+            <p:ph type="body" idx="10" sz="quarter"/>
           </p:nvPr>
         </p:nvSpPr>
         <p:spPr/>
@@ -18976,10 +18853,93 @@
           <a:lstStyle/>
           <a:p>
             <a:pPr>
-              <a:defRPr sz="2400"/>
+              <a:spcBef>
+                <a:spcPts val="1200"/>
+              </a:spcBef>
+              <a:spcAft>
+                <a:spcPts val="400"/>
+              </a:spcAft>
+              <a:defRPr b="1" sz="2200"/>
             </a:pPr>
             <a:r>
-              <a:t>Let's build it live!</a:t>
+              <a:t>Retail &amp; E-commerce:</a:t>
+            </a:r>
+          </a:p>
+          <a:p>
+            <a:pPr>
+              <a:spcBef>
+                <a:spcPts val="400"/>
+              </a:spcBef>
+              <a:spcAft>
+                <a:spcPts val="400"/>
+              </a:spcAft>
+              <a:defRPr sz="2000"/>
+            </a:pPr>
+            <a:r>
+              <a:t>• Product image tagging</a:t>
+            </a:r>
+          </a:p>
+          <a:p>
+            <a:pPr>
+              <a:spcBef>
+                <a:spcPts val="400"/>
+              </a:spcBef>
+              <a:spcAft>
+                <a:spcPts val="400"/>
+              </a:spcAft>
+              <a:defRPr sz="2000"/>
+            </a:pPr>
+            <a:r>
+              <a:t>• Visual search</a:t>
+            </a:r>
+          </a:p>
+          <a:p>
+            <a:pPr>
+              <a:spcAft>
+                <a:spcPts val="800"/>
+              </a:spcAft>
+            </a:pPr>
+          </a:p>
+          <a:p>
+            <a:pPr>
+              <a:spcBef>
+                <a:spcPts val="1200"/>
+              </a:spcBef>
+              <a:spcAft>
+                <a:spcPts val="400"/>
+              </a:spcAft>
+              <a:defRPr b="1" sz="2200"/>
+            </a:pPr>
+            <a:r>
+              <a:t>Document Processing:</a:t>
+            </a:r>
+          </a:p>
+          <a:p>
+            <a:pPr>
+              <a:spcBef>
+                <a:spcPts val="400"/>
+              </a:spcBef>
+              <a:spcAft>
+                <a:spcPts val="400"/>
+              </a:spcAft>
+              <a:defRPr sz="2000"/>
+            </a:pPr>
+            <a:r>
+              <a:t>• Digitize paper documents</a:t>
+            </a:r>
+          </a:p>
+          <a:p>
+            <a:pPr>
+              <a:spcBef>
+                <a:spcPts val="400"/>
+              </a:spcBef>
+              <a:spcAft>
+                <a:spcPts val="400"/>
+              </a:spcAft>
+              <a:defRPr sz="2000"/>
+            </a:pPr>
+            <a:r>
+              <a:t>• Extract data from receipts</a:t>
             </a:r>
           </a:p>
         </p:txBody>

</xml_diff>

<commit_message>
Update Azure AI Vision Workshop presentation
</commit_message>
<xml_diff>
--- a/Azure_AI_Vision_Workshop.pptx
+++ b/Azure_AI_Vision_Workshop.pptx
@@ -6,29 +6,29 @@
     <p:sldMasterId id="2147484642" r:id="rId5"/>
   </p:sldMasterIdLst>
   <p:notesMasterIdLst>
-    <p:notesMasterId r:id="rId24"/>
+    <p:notesMasterId r:id="rId23"/>
   </p:notesMasterIdLst>
   <p:handoutMasterIdLst>
-    <p:handoutMasterId r:id="rId25"/>
+    <p:handoutMasterId r:id="rId24"/>
   </p:handoutMasterIdLst>
   <p:sldIdLst>
     <p:sldId id="1862" r:id="rId6"/>
-    <p:sldId id="1863" r:id="rId15"/>
-    <p:sldId id="1864" r:id="rId16"/>
-    <p:sldId id="1865" r:id="rId17"/>
-    <p:sldId id="1866" r:id="rId18"/>
-    <p:sldId id="1867" r:id="rId19"/>
-    <p:sldId id="1868" r:id="rId20"/>
-    <p:sldId id="1869" r:id="rId21"/>
-    <p:sldId id="1870" r:id="rId22"/>
-    <p:sldId id="1871" r:id="rId23"/>
-    <p:sldId id="1872" r:id="rId14"/>
-    <p:sldId id="1873" r:id="rId13"/>
-    <p:sldId id="1874" r:id="rId12"/>
-    <p:sldId id="1875" r:id="rId11"/>
-    <p:sldId id="1876" r:id="rId10"/>
-    <p:sldId id="1877" r:id="rId9"/>
-    <p:sldId id="1878" r:id="rId8"/>
+    <p:sldId id="1863" r:id="rId7"/>
+    <p:sldId id="1864" r:id="rId8"/>
+    <p:sldId id="1865" r:id="rId9"/>
+    <p:sldId id="1866" r:id="rId10"/>
+    <p:sldId id="1867" r:id="rId11"/>
+    <p:sldId id="1868" r:id="rId12"/>
+    <p:sldId id="1869" r:id="rId13"/>
+    <p:sldId id="1870" r:id="rId14"/>
+    <p:sldId id="1871" r:id="rId15"/>
+    <p:sldId id="1872" r:id="rId16"/>
+    <p:sldId id="1873" r:id="rId17"/>
+    <p:sldId id="1874" r:id="rId18"/>
+    <p:sldId id="1875" r:id="rId19"/>
+    <p:sldId id="1876" r:id="rId20"/>
+    <p:sldId id="1877" r:id="rId21"/>
+    <p:sldId id="1878" r:id="rId22"/>
   </p:sldIdLst>
   <p:sldSz cx="12192000" cy="6858000"/>
   <p:notesSz cx="6858000" cy="9144000"/>
@@ -136,23 +136,22 @@
         <p14:section name="Dark template" id="{888AB95E-1B7E-4E95-8F39-C5D0E8372BC2}">
           <p14:sldIdLst>
             <p14:sldId id="1862"/>
-            <p14:sldId id="1860"/>
+            <p14:sldId id="1863"/>
+            <p14:sldId id="1864"/>
             <p14:sldId id="1865"/>
+            <p14:sldId id="1866"/>
+            <p14:sldId id="1867"/>
             <p14:sldId id="1868"/>
-            <p14:sldId id="1825"/>
-            <p14:sldId id="1826"/>
             <p14:sldId id="1869"/>
-            <p14:sldId id="1827"/>
-            <p14:sldId id="1828"/>
-            <p14:sldId id="1829"/>
-            <p14:sldId id="1861"/>
-            <p14:sldId id="1842"/>
-            <p14:sldId id="1854"/>
-            <p14:sldId id="1855"/>
-            <p14:sldId id="1856"/>
-            <p14:sldId id="1838"/>
-            <p14:sldId id="1839"/>
-            <p14:sldId id="1532"/>
+            <p14:sldId id="1870"/>
+            <p14:sldId id="1871"/>
+            <p14:sldId id="1872"/>
+            <p14:sldId id="1873"/>
+            <p14:sldId id="1874"/>
+            <p14:sldId id="1875"/>
+            <p14:sldId id="1876"/>
+            <p14:sldId id="1877"/>
+            <p14:sldId id="1878"/>
           </p14:sldIdLst>
         </p14:section>
       </p14:sectionLst>
@@ -293,7 +292,7 @@
               <a:rPr lang="en-US" smtClean="0">
                 <a:latin typeface="Segoe UI" pitchFamily="34" charset="0"/>
               </a:rPr>
-              <a:t>12/28/25 1:58 PM</a:t>
+              <a:t>12/29/25 1:00 AM</a:t>
             </a:fld>
             <a:endParaRPr lang="en-US">
               <a:latin typeface="Segoe UI" pitchFamily="34" charset="0"/>
@@ -571,7 +570,7 @@
           <a:p>
             <a:fld id="{386CE63F-9E7F-4C04-9D0D-FCA25A8E9E86}" type="datetime8">
               <a:rPr lang="en-US" smtClean="0"/>
-              <a:t>12/28/25 1:58 PM</a:t>
+              <a:t>12/29/25 1:00 AM</a:t>
             </a:fld>
             <a:endParaRPr lang="en-US"/>
           </a:p>
@@ -16997,7 +16996,7 @@
 </file>
 
 <file path=ppt/slides/slide10.xml><?xml version="1.0" encoding="utf-8"?>
-<p:sld xmlns:a="http://schemas.openxmlformats.org/drawingml/2006/main" xmlns:p="http://schemas.openxmlformats.org/presentationml/2006/main" xmlns:r="http://schemas.openxmlformats.org/officeDocument/2006/relationships">
+<p:sld xmlns:a="http://schemas.openxmlformats.org/drawingml/2006/main" xmlns:r="http://schemas.openxmlformats.org/officeDocument/2006/relationships" xmlns:p="http://schemas.openxmlformats.org/presentationml/2006/main">
   <p:cSld>
     <p:spTree>
       <p:nvGrpSpPr>
@@ -17005,7 +17004,14 @@
         <p:cNvGrpSpPr/>
         <p:nvPr/>
       </p:nvGrpSpPr>
-      <p:grpSpPr/>
+      <p:grpSpPr>
+        <a:xfrm>
+          <a:off x="0" y="0"/>
+          <a:ext cx="0" cy="0"/>
+          <a:chOff x="0" y="0"/>
+          <a:chExt cx="0" cy="0"/>
+        </a:xfrm>
+      </p:grpSpPr>
       <p:sp>
         <p:nvSpPr>
           <p:cNvPr id="2" name="Title 1"/>
@@ -17034,7 +17040,7 @@
             <a:spLocks noGrp="1"/>
           </p:cNvSpPr>
           <p:nvPr>
-            <p:ph type="body" idx="10" sz="quarter"/>
+            <p:ph type="body" sz="quarter" idx="10"/>
           </p:nvPr>
         </p:nvSpPr>
         <p:spPr/>
@@ -17049,7 +17055,7 @@
               <a:spcAft>
                 <a:spcPts val="400"/>
               </a:spcAft>
-              <a:defRPr b="1" sz="2200"/>
+              <a:defRPr sz="2200" b="1"/>
             </a:pPr>
             <a:r>
               <a:t>A Streamlit web app:</a:t>
@@ -17061,6 +17067,7 @@
                 <a:spcPts val="800"/>
               </a:spcAft>
             </a:pPr>
+            <a:endParaRPr/>
           </a:p>
           <a:p>
             <a:pPr>
@@ -17098,7 +17105,7 @@
               <a:spcAft>
                 <a:spcPts val="400"/>
               </a:spcAft>
-              <a:defRPr b="1" sz="2200"/>
+              <a:defRPr sz="2200" b="1"/>
             </a:pPr>
             <a:r>
               <a:t>3. Display results:</a:t>
@@ -17157,7 +17164,7 @@
 </file>
 
 <file path=ppt/slides/slide11.xml><?xml version="1.0" encoding="utf-8"?>
-<p:sld xmlns:a="http://schemas.openxmlformats.org/drawingml/2006/main" xmlns:p="http://schemas.openxmlformats.org/presentationml/2006/main" xmlns:r="http://schemas.openxmlformats.org/officeDocument/2006/relationships">
+<p:sld xmlns:a="http://schemas.openxmlformats.org/drawingml/2006/main" xmlns:r="http://schemas.openxmlformats.org/officeDocument/2006/relationships" xmlns:p="http://schemas.openxmlformats.org/presentationml/2006/main">
   <p:cSld>
     <p:spTree>
       <p:nvGrpSpPr>
@@ -17165,7 +17172,14 @@
         <p:cNvGrpSpPr/>
         <p:nvPr/>
       </p:nvGrpSpPr>
-      <p:grpSpPr/>
+      <p:grpSpPr>
+        <a:xfrm>
+          <a:off x="0" y="0"/>
+          <a:ext cx="0" cy="0"/>
+          <a:chOff x="0" y="0"/>
+          <a:chExt cx="0" cy="0"/>
+        </a:xfrm>
+      </p:grpSpPr>
       <p:sp>
         <p:nvSpPr>
           <p:cNvPr id="2" name="Title 1"/>
@@ -17194,7 +17208,7 @@
             <a:spLocks noGrp="1"/>
           </p:cNvSpPr>
           <p:nvPr>
-            <p:ph type="body" idx="10" sz="quarter"/>
+            <p:ph type="body" sz="quarter" idx="10"/>
           </p:nvPr>
         </p:nvSpPr>
         <p:spPr/>
@@ -17209,7 +17223,7 @@
               <a:spcAft>
                 <a:spcPts val="400"/>
               </a:spcAft>
-              <a:defRPr b="1" sz="2200"/>
+              <a:defRPr sz="2200" b="1"/>
             </a:pPr>
             <a:r>
               <a:t>Simple &amp; Powerful:</a:t>
@@ -17221,6 +17235,7 @@
                 <a:spcPts val="800"/>
               </a:spcAft>
             </a:pPr>
+            <a:endParaRPr/>
           </a:p>
           <a:p>
             <a:pPr>
@@ -17289,7 +17304,7 @@
 </file>
 
 <file path=ppt/slides/slide12.xml><?xml version="1.0" encoding="utf-8"?>
-<p:sld xmlns:a="http://schemas.openxmlformats.org/drawingml/2006/main" xmlns:p="http://schemas.openxmlformats.org/presentationml/2006/main" xmlns:r="http://schemas.openxmlformats.org/officeDocument/2006/relationships">
+<p:sld xmlns:a="http://schemas.openxmlformats.org/drawingml/2006/main" xmlns:r="http://schemas.openxmlformats.org/officeDocument/2006/relationships" xmlns:p="http://schemas.openxmlformats.org/presentationml/2006/main">
   <p:cSld>
     <p:spTree>
       <p:nvGrpSpPr>
@@ -17297,7 +17312,14 @@
         <p:cNvGrpSpPr/>
         <p:nvPr/>
       </p:nvGrpSpPr>
-      <p:grpSpPr/>
+      <p:grpSpPr>
+        <a:xfrm>
+          <a:off x="0" y="0"/>
+          <a:ext cx="0" cy="0"/>
+          <a:chOff x="0" y="0"/>
+          <a:chExt cx="0" cy="0"/>
+        </a:xfrm>
+      </p:grpSpPr>
       <p:sp>
         <p:nvSpPr>
           <p:cNvPr id="2" name="Title 1"/>
@@ -17326,7 +17348,7 @@
             <a:spLocks noGrp="1"/>
           </p:cNvSpPr>
           <p:nvPr>
-            <p:ph type="body" idx="12" sz="quarter"/>
+            <p:ph type="body" sz="quarter" idx="12"/>
           </p:nvPr>
         </p:nvSpPr>
         <p:spPr/>
@@ -17352,7 +17374,7 @@
 </file>
 
 <file path=ppt/slides/slide13.xml><?xml version="1.0" encoding="utf-8"?>
-<p:sld xmlns:a="http://schemas.openxmlformats.org/drawingml/2006/main" xmlns:p="http://schemas.openxmlformats.org/presentationml/2006/main" xmlns:r="http://schemas.openxmlformats.org/officeDocument/2006/relationships">
+<p:sld xmlns:a="http://schemas.openxmlformats.org/drawingml/2006/main" xmlns:r="http://schemas.openxmlformats.org/officeDocument/2006/relationships" xmlns:p="http://schemas.openxmlformats.org/presentationml/2006/main">
   <p:cSld>
     <p:spTree>
       <p:nvGrpSpPr>
@@ -17360,7 +17382,14 @@
         <p:cNvGrpSpPr/>
         <p:nvPr/>
       </p:nvGrpSpPr>
-      <p:grpSpPr/>
+      <p:grpSpPr>
+        <a:xfrm>
+          <a:off x="0" y="0"/>
+          <a:ext cx="0" cy="0"/>
+          <a:chOff x="0" y="0"/>
+          <a:chExt cx="0" cy="0"/>
+        </a:xfrm>
+      </p:grpSpPr>
       <p:sp>
         <p:nvSpPr>
           <p:cNvPr id="2" name="Title 1"/>
@@ -17389,7 +17418,7 @@
             <a:spLocks noGrp="1"/>
           </p:cNvSpPr>
           <p:nvPr>
-            <p:ph type="body" idx="10" sz="quarter"/>
+            <p:ph type="body" sz="quarter" idx="10"/>
           </p:nvPr>
         </p:nvSpPr>
         <p:spPr/>
@@ -17404,7 +17433,7 @@
               <a:spcAft>
                 <a:spcPts val="400"/>
               </a:spcAft>
-              <a:defRPr b="1" sz="2200"/>
+              <a:defRPr sz="2200" b="1"/>
             </a:pPr>
             <a:r>
               <a:t>Documentation:</a:t>
@@ -17430,6 +17459,7 @@
                 <a:spcPts val="800"/>
               </a:spcAft>
             </a:pPr>
+            <a:endParaRPr/>
           </a:p>
           <a:p>
             <a:pPr>
@@ -17439,7 +17469,7 @@
               <a:spcAft>
                 <a:spcPts val="400"/>
               </a:spcAft>
-              <a:defRPr b="1" sz="2200"/>
+              <a:defRPr sz="2200" b="1"/>
             </a:pPr>
             <a:r>
               <a:t>Microsoft Learn Path:</a:t>
@@ -17465,6 +17495,7 @@
                 <a:spcPts val="800"/>
               </a:spcAft>
             </a:pPr>
+            <a:endParaRPr/>
           </a:p>
           <a:p>
             <a:pPr>
@@ -17474,7 +17505,7 @@
               <a:spcAft>
                 <a:spcPts val="400"/>
               </a:spcAft>
-              <a:defRPr b="1" sz="2200"/>
+              <a:defRPr sz="2200" b="1"/>
             </a:pPr>
             <a:r>
               <a:t>Code from Today:</a:t>
@@ -17505,7 +17536,7 @@
 </file>
 
 <file path=ppt/slides/slide14.xml><?xml version="1.0" encoding="utf-8"?>
-<p:sld xmlns:a="http://schemas.openxmlformats.org/drawingml/2006/main" xmlns:p="http://schemas.openxmlformats.org/presentationml/2006/main" xmlns:r="http://schemas.openxmlformats.org/officeDocument/2006/relationships">
+<p:sld xmlns:a="http://schemas.openxmlformats.org/drawingml/2006/main" xmlns:r="http://schemas.openxmlformats.org/officeDocument/2006/relationships" xmlns:p="http://schemas.openxmlformats.org/presentationml/2006/main">
   <p:cSld>
     <p:spTree>
       <p:nvGrpSpPr>
@@ -17513,7 +17544,14 @@
         <p:cNvGrpSpPr/>
         <p:nvPr/>
       </p:nvGrpSpPr>
-      <p:grpSpPr/>
+      <p:grpSpPr>
+        <a:xfrm>
+          <a:off x="0" y="0"/>
+          <a:ext cx="0" cy="0"/>
+          <a:chOff x="0" y="0"/>
+          <a:chExt cx="0" cy="0"/>
+        </a:xfrm>
+      </p:grpSpPr>
       <p:sp>
         <p:nvSpPr>
           <p:cNvPr id="2" name="Title 1"/>
@@ -17542,7 +17580,7 @@
             <a:spLocks noGrp="1"/>
           </p:cNvSpPr>
           <p:nvPr>
-            <p:ph type="body" idx="10" sz="quarter"/>
+            <p:ph type="body" sz="quarter" idx="10"/>
           </p:nvPr>
         </p:nvSpPr>
         <p:spPr/>
@@ -17557,7 +17595,7 @@
               <a:spcAft>
                 <a:spcPts val="400"/>
               </a:spcAft>
-              <a:defRPr b="1" sz="2200"/>
+              <a:defRPr sz="2200" b="1"/>
             </a:pPr>
             <a:r>
               <a:t>Continue your journey:</a:t>
@@ -17569,6 +17607,7 @@
                 <a:spcPts val="800"/>
               </a:spcAft>
             </a:pPr>
+            <a:endParaRPr/>
           </a:p>
           <a:p>
             <a:pPr>
@@ -17604,6 +17643,7 @@
                 <a:spcPts val="800"/>
               </a:spcAft>
             </a:pPr>
+            <a:endParaRPr/>
           </a:p>
           <a:p>
             <a:pPr>
@@ -17630,7 +17670,7 @@
 </file>
 
 <file path=ppt/slides/slide15.xml><?xml version="1.0" encoding="utf-8"?>
-<p:sld xmlns:a="http://schemas.openxmlformats.org/drawingml/2006/main" xmlns:p="http://schemas.openxmlformats.org/presentationml/2006/main" xmlns:r="http://schemas.openxmlformats.org/officeDocument/2006/relationships">
+<p:sld xmlns:a="http://schemas.openxmlformats.org/drawingml/2006/main" xmlns:r="http://schemas.openxmlformats.org/officeDocument/2006/relationships" xmlns:p="http://schemas.openxmlformats.org/presentationml/2006/main">
   <p:cSld>
     <p:spTree>
       <p:nvGrpSpPr>
@@ -17638,7 +17678,14 @@
         <p:cNvGrpSpPr/>
         <p:nvPr/>
       </p:nvGrpSpPr>
-      <p:grpSpPr/>
+      <p:grpSpPr>
+        <a:xfrm>
+          <a:off x="0" y="0"/>
+          <a:ext cx="0" cy="0"/>
+          <a:chOff x="0" y="0"/>
+          <a:chExt cx="0" cy="0"/>
+        </a:xfrm>
+      </p:grpSpPr>
       <p:sp>
         <p:nvSpPr>
           <p:cNvPr id="2" name="Title 1"/>
@@ -17669,7 +17716,7 @@
 </file>
 
 <file path=ppt/slides/slide16.xml><?xml version="1.0" encoding="utf-8"?>
-<p:sld xmlns:a="http://schemas.openxmlformats.org/drawingml/2006/main" xmlns:p="http://schemas.openxmlformats.org/presentationml/2006/main" xmlns:r="http://schemas.openxmlformats.org/officeDocument/2006/relationships">
+<p:sld xmlns:a="http://schemas.openxmlformats.org/drawingml/2006/main" xmlns:r="http://schemas.openxmlformats.org/officeDocument/2006/relationships" xmlns:p="http://schemas.openxmlformats.org/presentationml/2006/main">
   <p:cSld>
     <p:spTree>
       <p:nvGrpSpPr>
@@ -17677,7 +17724,14 @@
         <p:cNvGrpSpPr/>
         <p:nvPr/>
       </p:nvGrpSpPr>
-      <p:grpSpPr/>
+      <p:grpSpPr>
+        <a:xfrm>
+          <a:off x="0" y="0"/>
+          <a:ext cx="0" cy="0"/>
+          <a:chOff x="0" y="0"/>
+          <a:chExt cx="0" cy="0"/>
+        </a:xfrm>
+      </p:grpSpPr>
       <p:sp>
         <p:nvSpPr>
           <p:cNvPr id="2" name="Title 1"/>
@@ -17706,7 +17760,7 @@
             <a:spLocks noGrp="1"/>
           </p:cNvSpPr>
           <p:nvPr>
-            <p:ph type="body" idx="10" sz="quarter"/>
+            <p:ph type="body" sz="quarter" idx="10"/>
           </p:nvPr>
         </p:nvSpPr>
         <p:spPr/>
@@ -17733,6 +17787,7 @@
                 <a:spcPts val="800"/>
               </a:spcAft>
             </a:pPr>
+            <a:endParaRPr/>
           </a:p>
           <a:p>
             <a:pPr>
@@ -17742,7 +17797,7 @@
               <a:spcAft>
                 <a:spcPts val="400"/>
               </a:spcAft>
-              <a:defRPr b="1" sz="2200"/>
+              <a:defRPr sz="2200" b="1"/>
             </a:pPr>
             <a:r>
               <a:t>LinkedIn:</a:t>
@@ -17768,6 +17823,7 @@
                 <a:spcPts val="800"/>
               </a:spcAft>
             </a:pPr>
+            <a:endParaRPr/>
           </a:p>
           <a:p>
             <a:pPr>
@@ -17777,7 +17833,7 @@
               <a:spcAft>
                 <a:spcPts val="400"/>
               </a:spcAft>
-              <a:defRPr b="1" sz="2200"/>
+              <a:defRPr sz="2200" b="1"/>
             </a:pPr>
             <a:r>
               <a:t>GitHub:</a:t>
@@ -17808,7 +17864,7 @@
 </file>
 
 <file path=ppt/slides/slide17.xml><?xml version="1.0" encoding="utf-8"?>
-<p:sld xmlns:a="http://schemas.openxmlformats.org/drawingml/2006/main" xmlns:p="http://schemas.openxmlformats.org/presentationml/2006/main" xmlns:r="http://schemas.openxmlformats.org/officeDocument/2006/relationships">
+<p:sld xmlns:a="http://schemas.openxmlformats.org/drawingml/2006/main" xmlns:r="http://schemas.openxmlformats.org/officeDocument/2006/relationships" xmlns:p="http://schemas.openxmlformats.org/presentationml/2006/main">
   <p:cSld>
     <p:spTree>
       <p:nvGrpSpPr>
@@ -17816,7 +17872,14 @@
         <p:cNvGrpSpPr/>
         <p:nvPr/>
       </p:nvGrpSpPr>
-      <p:grpSpPr/>
+      <p:grpSpPr>
+        <a:xfrm>
+          <a:off x="0" y="0"/>
+          <a:ext cx="0" cy="0"/>
+          <a:chOff x="0" y="0"/>
+          <a:chExt cx="0" cy="0"/>
+        </a:xfrm>
+      </p:grpSpPr>
       <p:sp>
         <p:nvSpPr>
           <p:cNvPr id="2" name="Title 1"/>
@@ -17847,7 +17910,7 @@
 </file>
 
 <file path=ppt/slides/slide2.xml><?xml version="1.0" encoding="utf-8"?>
-<p:sld xmlns:a="http://schemas.openxmlformats.org/drawingml/2006/main" xmlns:p="http://schemas.openxmlformats.org/presentationml/2006/main" xmlns:r="http://schemas.openxmlformats.org/officeDocument/2006/relationships">
+<p:sld xmlns:a="http://schemas.openxmlformats.org/drawingml/2006/main" xmlns:r="http://schemas.openxmlformats.org/officeDocument/2006/relationships" xmlns:p="http://schemas.openxmlformats.org/presentationml/2006/main">
   <p:cSld>
     <p:spTree>
       <p:nvGrpSpPr>
@@ -17855,7 +17918,14 @@
         <p:cNvGrpSpPr/>
         <p:nvPr/>
       </p:nvGrpSpPr>
-      <p:grpSpPr/>
+      <p:grpSpPr>
+        <a:xfrm>
+          <a:off x="0" y="0"/>
+          <a:ext cx="0" cy="0"/>
+          <a:chOff x="0" y="0"/>
+          <a:chExt cx="0" cy="0"/>
+        </a:xfrm>
+      </p:grpSpPr>
       <p:sp>
         <p:nvSpPr>
           <p:cNvPr id="2" name="Title 1"/>
@@ -17884,7 +17954,7 @@
             <a:spLocks noGrp="1"/>
           </p:cNvSpPr>
           <p:nvPr>
-            <p:ph type="body" idx="12" sz="quarter"/>
+            <p:ph type="body" sz="quarter" idx="12"/>
           </p:nvPr>
         </p:nvSpPr>
         <p:spPr/>
@@ -17910,7 +17980,7 @@
 </file>
 
 <file path=ppt/slides/slide3.xml><?xml version="1.0" encoding="utf-8"?>
-<p:sld xmlns:a="http://schemas.openxmlformats.org/drawingml/2006/main" xmlns:p="http://schemas.openxmlformats.org/presentationml/2006/main" xmlns:r="http://schemas.openxmlformats.org/officeDocument/2006/relationships">
+<p:sld xmlns:a="http://schemas.openxmlformats.org/drawingml/2006/main" xmlns:r="http://schemas.openxmlformats.org/officeDocument/2006/relationships" xmlns:p="http://schemas.openxmlformats.org/presentationml/2006/main">
   <p:cSld>
     <p:spTree>
       <p:nvGrpSpPr>
@@ -17918,7 +17988,14 @@
         <p:cNvGrpSpPr/>
         <p:nvPr/>
       </p:nvGrpSpPr>
-      <p:grpSpPr/>
+      <p:grpSpPr>
+        <a:xfrm>
+          <a:off x="0" y="0"/>
+          <a:ext cx="0" cy="0"/>
+          <a:chOff x="0" y="0"/>
+          <a:chExt cx="0" cy="0"/>
+        </a:xfrm>
+      </p:grpSpPr>
       <p:sp>
         <p:nvSpPr>
           <p:cNvPr id="2" name="Title 1"/>
@@ -17947,10 +18024,15 @@
             <a:spLocks noGrp="1"/>
           </p:cNvSpPr>
           <p:nvPr>
-            <p:ph type="body" idx="10" sz="quarter"/>
+            <p:ph type="body" sz="quarter" idx="10"/>
           </p:nvPr>
         </p:nvSpPr>
-        <p:spPr/>
+        <p:spPr>
+          <a:xfrm>
+            <a:off x="586390" y="1434370"/>
+            <a:ext cx="11018520" cy="2158540"/>
+          </a:xfrm>
+        </p:spPr>
         <p:txBody>
           <a:bodyPr/>
           <a:lstStyle/>
@@ -17965,6 +18047,7 @@
               <a:defRPr sz="2000"/>
             </a:pPr>
             <a:r>
+              <a:rPr b="1" dirty="0"/>
               <a:t>Jainal Gosaliya</a:t>
             </a:r>
           </a:p>
@@ -17974,6 +18057,7 @@
                 <a:spcPts val="800"/>
               </a:spcAft>
             </a:pPr>
+            <a:endParaRPr dirty="0"/>
           </a:p>
           <a:p>
             <a:pPr>
@@ -17986,15 +18070,10 @@
               <a:defRPr sz="2000"/>
             </a:pPr>
             <a:r>
+              <a:rPr b="1" dirty="0"/>
               <a:t>Beta Microsoft Learn Student Ambassador</a:t>
             </a:r>
-          </a:p>
-          <a:p>
-            <a:pPr>
-              <a:spcAft>
-                <a:spcPts val="800"/>
-              </a:spcAft>
-            </a:pPr>
+            <a:endParaRPr lang="en-US" b="1" dirty="0"/>
           </a:p>
           <a:p>
             <a:pPr>
@@ -18006,9 +18085,7 @@
               </a:spcAft>
               <a:defRPr sz="2000"/>
             </a:pPr>
-            <a:r>
-              <a:t>Masters in Software Engineering Systems</a:t>
-            </a:r>
+            <a:endParaRPr dirty="0"/>
           </a:p>
           <a:p>
             <a:pPr>
@@ -18021,27 +18098,7 @@
               <a:defRPr sz="2000"/>
             </a:pPr>
             <a:r>
-              <a:t>Northeastern University</a:t>
-            </a:r>
-          </a:p>
-          <a:p>
-            <a:pPr>
-              <a:spcAft>
-                <a:spcPts val="800"/>
-              </a:spcAft>
-            </a:pPr>
-          </a:p>
-          <a:p>
-            <a:pPr>
-              <a:spcBef>
-                <a:spcPts val="400"/>
-              </a:spcBef>
-              <a:spcAft>
-                <a:spcPts val="400"/>
-              </a:spcAft>
-              <a:defRPr sz="2000"/>
-            </a:pPr>
-            <a:r>
+              <a:rPr dirty="0"/>
               <a:t>Passionate about Python, AI &amp; Azure!</a:t>
             </a:r>
           </a:p>
@@ -18056,7 +18113,7 @@
 </file>
 
 <file path=ppt/slides/slide4.xml><?xml version="1.0" encoding="utf-8"?>
-<p:sld xmlns:a="http://schemas.openxmlformats.org/drawingml/2006/main" xmlns:p="http://schemas.openxmlformats.org/presentationml/2006/main" xmlns:r="http://schemas.openxmlformats.org/officeDocument/2006/relationships">
+<p:sld xmlns:a="http://schemas.openxmlformats.org/drawingml/2006/main" xmlns:r="http://schemas.openxmlformats.org/officeDocument/2006/relationships" xmlns:p="http://schemas.openxmlformats.org/presentationml/2006/main">
   <p:cSld>
     <p:spTree>
       <p:nvGrpSpPr>
@@ -18064,7 +18121,14 @@
         <p:cNvGrpSpPr/>
         <p:nvPr/>
       </p:nvGrpSpPr>
-      <p:grpSpPr/>
+      <p:grpSpPr>
+        <a:xfrm>
+          <a:off x="0" y="0"/>
+          <a:ext cx="0" cy="0"/>
+          <a:chOff x="0" y="0"/>
+          <a:chExt cx="0" cy="0"/>
+        </a:xfrm>
+      </p:grpSpPr>
       <p:sp>
         <p:nvSpPr>
           <p:cNvPr id="2" name="Title 1"/>
@@ -18093,10 +18157,15 @@
             <a:spLocks noGrp="1"/>
           </p:cNvSpPr>
           <p:nvPr>
-            <p:ph type="body" idx="10" sz="quarter"/>
+            <p:ph type="body" sz="quarter" idx="10"/>
           </p:nvPr>
         </p:nvSpPr>
-        <p:spPr/>
+        <p:spPr>
+          <a:xfrm>
+            <a:off x="586390" y="1434370"/>
+            <a:ext cx="11018520" cy="2728952"/>
+          </a:xfrm>
+        </p:spPr>
         <p:txBody>
           <a:bodyPr/>
           <a:lstStyle/>
@@ -18108,11 +18177,16 @@
               <a:spcAft>
                 <a:spcPts val="400"/>
               </a:spcAft>
-              <a:defRPr b="1" sz="2200"/>
+              <a:defRPr sz="2200" b="1"/>
             </a:pPr>
             <a:r>
+              <a:rPr dirty="0"/>
               <a:t>Today's Plan:</a:t>
             </a:r>
+            <a:br>
+              <a:rPr lang="en-US" dirty="0"/>
+            </a:br>
+            <a:endParaRPr dirty="0"/>
           </a:p>
           <a:p>
             <a:pPr>
@@ -18125,6 +18199,7 @@
               <a:defRPr sz="2000"/>
             </a:pPr>
             <a:r>
+              <a:rPr dirty="0"/>
               <a:t>• What is Azure AI Vision?</a:t>
             </a:r>
           </a:p>
@@ -18139,6 +18214,7 @@
               <a:defRPr sz="2000"/>
             </a:pPr>
             <a:r>
+              <a:rPr dirty="0"/>
               <a:t>• Key Features</a:t>
             </a:r>
           </a:p>
@@ -18153,6 +18229,7 @@
               <a:defRPr sz="2000"/>
             </a:pPr>
             <a:r>
+              <a:rPr dirty="0"/>
               <a:t>• Real-World Use Cases</a:t>
             </a:r>
           </a:p>
@@ -18167,6 +18244,7 @@
               <a:defRPr sz="2000"/>
             </a:pPr>
             <a:r>
+              <a:rPr dirty="0"/>
               <a:t>• Live Demo</a:t>
             </a:r>
           </a:p>
@@ -18181,6 +18259,7 @@
               <a:defRPr sz="2000"/>
             </a:pPr>
             <a:r>
+              <a:rPr dirty="0"/>
               <a:t>• Q&amp;A</a:t>
             </a:r>
           </a:p>
@@ -18195,7 +18274,7 @@
 </file>
 
 <file path=ppt/slides/slide5.xml><?xml version="1.0" encoding="utf-8"?>
-<p:sld xmlns:a="http://schemas.openxmlformats.org/drawingml/2006/main" xmlns:p="http://schemas.openxmlformats.org/presentationml/2006/main" xmlns:r="http://schemas.openxmlformats.org/officeDocument/2006/relationships">
+<p:sld xmlns:a="http://schemas.openxmlformats.org/drawingml/2006/main" xmlns:r="http://schemas.openxmlformats.org/officeDocument/2006/relationships" xmlns:p="http://schemas.openxmlformats.org/presentationml/2006/main">
   <p:cSld>
     <p:spTree>
       <p:nvGrpSpPr>
@@ -18203,7 +18282,14 @@
         <p:cNvGrpSpPr/>
         <p:nvPr/>
       </p:nvGrpSpPr>
-      <p:grpSpPr/>
+      <p:grpSpPr>
+        <a:xfrm>
+          <a:off x="0" y="0"/>
+          <a:ext cx="0" cy="0"/>
+          <a:chOff x="0" y="0"/>
+          <a:chExt cx="0" cy="0"/>
+        </a:xfrm>
+      </p:grpSpPr>
       <p:sp>
         <p:nvSpPr>
           <p:cNvPr id="2" name="Title 1"/>
@@ -18232,7 +18318,7 @@
             <a:spLocks noGrp="1"/>
           </p:cNvSpPr>
           <p:nvPr>
-            <p:ph type="body" idx="10" sz="quarter"/>
+            <p:ph type="body" sz="quarter" idx="10"/>
           </p:nvPr>
         </p:nvSpPr>
         <p:spPr/>
@@ -18250,6 +18336,7 @@
               <a:defRPr sz="2000"/>
             </a:pPr>
             <a:r>
+              <a:rPr dirty="0"/>
               <a:t>Cloud-based AI for image analysis</a:t>
             </a:r>
           </a:p>
@@ -18259,6 +18346,7 @@
                 <a:spcPts val="800"/>
               </a:spcAft>
             </a:pPr>
+            <a:endParaRPr dirty="0"/>
           </a:p>
           <a:p>
             <a:pPr>
@@ -18271,6 +18359,7 @@
               <a:defRPr sz="2000"/>
             </a:pPr>
             <a:r>
+              <a:rPr dirty="0"/>
               <a:t>Part of Microsoft Azure AI Services</a:t>
             </a:r>
           </a:p>
@@ -18280,6 +18369,7 @@
                 <a:spcPts val="800"/>
               </a:spcAft>
             </a:pPr>
+            <a:endParaRPr dirty="0"/>
           </a:p>
           <a:p>
             <a:pPr>
@@ -18289,9 +18379,10 @@
               <a:spcAft>
                 <a:spcPts val="400"/>
               </a:spcAft>
-              <a:defRPr b="1" sz="2200"/>
+              <a:defRPr sz="2200" b="1"/>
             </a:pPr>
             <a:r>
+              <a:rPr dirty="0"/>
               <a:t>Capabilities:</a:t>
             </a:r>
           </a:p>
@@ -18306,6 +18397,7 @@
               <a:defRPr sz="2000"/>
             </a:pPr>
             <a:r>
+              <a:rPr dirty="0"/>
               <a:t>• Extract text from images (OCR)</a:t>
             </a:r>
           </a:p>
@@ -18320,6 +18412,7 @@
               <a:defRPr sz="2000"/>
             </a:pPr>
             <a:r>
+              <a:rPr dirty="0"/>
               <a:t>• Detect objects in photos</a:t>
             </a:r>
           </a:p>
@@ -18334,6 +18427,7 @@
               <a:defRPr sz="2000"/>
             </a:pPr>
             <a:r>
+              <a:rPr dirty="0"/>
               <a:t>• Generate image descriptions</a:t>
             </a:r>
           </a:p>
@@ -18348,6 +18442,7 @@
               <a:defRPr sz="2000"/>
             </a:pPr>
             <a:r>
+              <a:rPr dirty="0"/>
               <a:t>• Analyze image content</a:t>
             </a:r>
           </a:p>
@@ -18362,7 +18457,7 @@
 </file>
 
 <file path=ppt/slides/slide6.xml><?xml version="1.0" encoding="utf-8"?>
-<p:sld xmlns:a="http://schemas.openxmlformats.org/drawingml/2006/main" xmlns:p="http://schemas.openxmlformats.org/presentationml/2006/main" xmlns:r="http://schemas.openxmlformats.org/officeDocument/2006/relationships">
+<p:sld xmlns:a="http://schemas.openxmlformats.org/drawingml/2006/main" xmlns:r="http://schemas.openxmlformats.org/officeDocument/2006/relationships" xmlns:p="http://schemas.openxmlformats.org/presentationml/2006/main">
   <p:cSld>
     <p:spTree>
       <p:nvGrpSpPr>
@@ -18370,7 +18465,14 @@
         <p:cNvGrpSpPr/>
         <p:nvPr/>
       </p:nvGrpSpPr>
-      <p:grpSpPr/>
+      <p:grpSpPr>
+        <a:xfrm>
+          <a:off x="0" y="0"/>
+          <a:ext cx="0" cy="0"/>
+          <a:chOff x="0" y="0"/>
+          <a:chExt cx="0" cy="0"/>
+        </a:xfrm>
+      </p:grpSpPr>
       <p:sp>
         <p:nvSpPr>
           <p:cNvPr id="2" name="Title 1"/>
@@ -18399,7 +18501,7 @@
             <a:spLocks noGrp="1"/>
           </p:cNvSpPr>
           <p:nvPr>
-            <p:ph type="body" idx="10" sz="quarter"/>
+            <p:ph type="body" sz="quarter" idx="10"/>
           </p:nvPr>
         </p:nvSpPr>
         <p:spPr/>
@@ -18426,6 +18528,7 @@
                 <a:spcPts val="800"/>
               </a:spcAft>
             </a:pPr>
+            <a:endParaRPr/>
           </a:p>
           <a:p>
             <a:pPr>
@@ -18475,6 +18578,7 @@
                 <a:spcPts val="800"/>
               </a:spcAft>
             </a:pPr>
+            <a:endParaRPr/>
           </a:p>
           <a:p>
             <a:pPr>
@@ -18501,7 +18605,7 @@
 </file>
 
 <file path=ppt/slides/slide7.xml><?xml version="1.0" encoding="utf-8"?>
-<p:sld xmlns:a="http://schemas.openxmlformats.org/drawingml/2006/main" xmlns:p="http://schemas.openxmlformats.org/presentationml/2006/main" xmlns:r="http://schemas.openxmlformats.org/officeDocument/2006/relationships">
+<p:sld xmlns:a="http://schemas.openxmlformats.org/drawingml/2006/main" xmlns:r="http://schemas.openxmlformats.org/officeDocument/2006/relationships" xmlns:p="http://schemas.openxmlformats.org/presentationml/2006/main">
   <p:cSld>
     <p:spTree>
       <p:nvGrpSpPr>
@@ -18509,7 +18613,14 @@
         <p:cNvGrpSpPr/>
         <p:nvPr/>
       </p:nvGrpSpPr>
-      <p:grpSpPr/>
+      <p:grpSpPr>
+        <a:xfrm>
+          <a:off x="0" y="0"/>
+          <a:ext cx="0" cy="0"/>
+          <a:chOff x="0" y="0"/>
+          <a:chExt cx="0" cy="0"/>
+        </a:xfrm>
+      </p:grpSpPr>
       <p:sp>
         <p:nvSpPr>
           <p:cNvPr id="2" name="Title 1"/>
@@ -18538,10 +18649,15 @@
             <a:spLocks noGrp="1"/>
           </p:cNvSpPr>
           <p:nvPr>
-            <p:ph type="body" idx="10" sz="quarter"/>
+            <p:ph type="body" sz="quarter" idx="10"/>
           </p:nvPr>
         </p:nvSpPr>
-        <p:spPr/>
+        <p:spPr>
+          <a:xfrm>
+            <a:off x="586390" y="1434370"/>
+            <a:ext cx="11018520" cy="3611245"/>
+          </a:xfrm>
+        </p:spPr>
         <p:txBody>
           <a:bodyPr/>
           <a:lstStyle/>
@@ -18553,9 +18669,10 @@
               <a:spcAft>
                 <a:spcPts val="400"/>
               </a:spcAft>
-              <a:defRPr b="1" sz="2200"/>
+              <a:defRPr sz="2200" b="1"/>
             </a:pPr>
             <a:r>
+              <a:rPr dirty="0"/>
               <a:t>OCR (Read):</a:t>
             </a:r>
           </a:p>
@@ -18570,15 +18687,9 @@
               <a:defRPr sz="2000"/>
             </a:pPr>
             <a:r>
+              <a:rPr dirty="0"/>
               <a:t>• Extract printed &amp; handwritten text</a:t>
             </a:r>
-          </a:p>
-          <a:p>
-            <a:pPr>
-              <a:spcAft>
-                <a:spcPts val="800"/>
-              </a:spcAft>
-            </a:pPr>
           </a:p>
           <a:p>
             <a:pPr>
@@ -18588,9 +18699,10 @@
               <a:spcAft>
                 <a:spcPts val="400"/>
               </a:spcAft>
-              <a:defRPr b="1" sz="2200"/>
+              <a:defRPr sz="2200" b="1"/>
             </a:pPr>
             <a:r>
+              <a:rPr dirty="0"/>
               <a:t>Image Captions:</a:t>
             </a:r>
           </a:p>
@@ -18605,15 +18717,9 @@
               <a:defRPr sz="2000"/>
             </a:pPr>
             <a:r>
+              <a:rPr dirty="0"/>
               <a:t>• "A dog playing in the park"</a:t>
             </a:r>
-          </a:p>
-          <a:p>
-            <a:pPr>
-              <a:spcAft>
-                <a:spcPts val="800"/>
-              </a:spcAft>
-            </a:pPr>
           </a:p>
           <a:p>
             <a:pPr>
@@ -18623,9 +18729,10 @@
               <a:spcAft>
                 <a:spcPts val="400"/>
               </a:spcAft>
-              <a:defRPr b="1" sz="2200"/>
+              <a:defRPr sz="2200" b="1"/>
             </a:pPr>
             <a:r>
+              <a:rPr dirty="0"/>
               <a:t>Object Detection:</a:t>
             </a:r>
           </a:p>
@@ -18640,15 +18747,9 @@
               <a:defRPr sz="2000"/>
             </a:pPr>
             <a:r>
+              <a:rPr dirty="0"/>
               <a:t>• Identify objects with bounding boxes</a:t>
             </a:r>
-          </a:p>
-          <a:p>
-            <a:pPr>
-              <a:spcAft>
-                <a:spcPts val="800"/>
-              </a:spcAft>
-            </a:pPr>
           </a:p>
           <a:p>
             <a:pPr>
@@ -18658,9 +18759,10 @@
               <a:spcAft>
                 <a:spcPts val="400"/>
               </a:spcAft>
-              <a:defRPr b="1" sz="2200"/>
+              <a:defRPr sz="2200" b="1"/>
             </a:pPr>
             <a:r>
+              <a:rPr dirty="0"/>
               <a:t>Smart Tags:</a:t>
             </a:r>
           </a:p>
@@ -18675,6 +18777,7 @@
               <a:defRPr sz="2000"/>
             </a:pPr>
             <a:r>
+              <a:rPr dirty="0"/>
               <a:t>• Auto-label images with keywords</a:t>
             </a:r>
           </a:p>
@@ -18689,7 +18792,7 @@
 </file>
 
 <file path=ppt/slides/slide8.xml><?xml version="1.0" encoding="utf-8"?>
-<p:sld xmlns:a="http://schemas.openxmlformats.org/drawingml/2006/main" xmlns:p="http://schemas.openxmlformats.org/presentationml/2006/main" xmlns:r="http://schemas.openxmlformats.org/officeDocument/2006/relationships">
+<p:sld xmlns:a="http://schemas.openxmlformats.org/drawingml/2006/main" xmlns:r="http://schemas.openxmlformats.org/officeDocument/2006/relationships" xmlns:p="http://schemas.openxmlformats.org/presentationml/2006/main">
   <p:cSld>
     <p:spTree>
       <p:nvGrpSpPr>
@@ -18697,7 +18800,14 @@
         <p:cNvGrpSpPr/>
         <p:nvPr/>
       </p:nvGrpSpPr>
-      <p:grpSpPr/>
+      <p:grpSpPr>
+        <a:xfrm>
+          <a:off x="0" y="0"/>
+          <a:ext cx="0" cy="0"/>
+          <a:chOff x="0" y="0"/>
+          <a:chExt cx="0" cy="0"/>
+        </a:xfrm>
+      </p:grpSpPr>
       <p:sp>
         <p:nvSpPr>
           <p:cNvPr id="2" name="Title 1"/>
@@ -18726,7 +18836,7 @@
             <a:spLocks noGrp="1"/>
           </p:cNvSpPr>
           <p:nvPr>
-            <p:ph type="body" idx="10" sz="quarter"/>
+            <p:ph type="body" sz="quarter" idx="10"/>
           </p:nvPr>
         </p:nvSpPr>
         <p:spPr/>
@@ -18741,7 +18851,7 @@
               <a:spcAft>
                 <a:spcPts val="400"/>
               </a:spcAft>
-              <a:defRPr b="1" sz="2200"/>
+              <a:defRPr sz="2200" b="1"/>
             </a:pPr>
             <a:r>
               <a:t>Helping visually impaired users:</a:t>
@@ -18753,6 +18863,7 @@
                 <a:spcPts val="800"/>
               </a:spcAft>
             </a:pPr>
+            <a:endParaRPr/>
           </a:p>
           <a:p>
             <a:pPr>
@@ -18807,7 +18918,7 @@
 </file>
 
 <file path=ppt/slides/slide9.xml><?xml version="1.0" encoding="utf-8"?>
-<p:sld xmlns:a="http://schemas.openxmlformats.org/drawingml/2006/main" xmlns:p="http://schemas.openxmlformats.org/presentationml/2006/main" xmlns:r="http://schemas.openxmlformats.org/officeDocument/2006/relationships">
+<p:sld xmlns:a="http://schemas.openxmlformats.org/drawingml/2006/main" xmlns:r="http://schemas.openxmlformats.org/officeDocument/2006/relationships" xmlns:p="http://schemas.openxmlformats.org/presentationml/2006/main">
   <p:cSld>
     <p:spTree>
       <p:nvGrpSpPr>
@@ -18815,7 +18926,14 @@
         <p:cNvGrpSpPr/>
         <p:nvPr/>
       </p:nvGrpSpPr>
-      <p:grpSpPr/>
+      <p:grpSpPr>
+        <a:xfrm>
+          <a:off x="0" y="0"/>
+          <a:ext cx="0" cy="0"/>
+          <a:chOff x="0" y="0"/>
+          <a:chExt cx="0" cy="0"/>
+        </a:xfrm>
+      </p:grpSpPr>
       <p:sp>
         <p:nvSpPr>
           <p:cNvPr id="2" name="Title 1"/>
@@ -18844,7 +18962,7 @@
             <a:spLocks noGrp="1"/>
           </p:cNvSpPr>
           <p:nvPr>
-            <p:ph type="body" idx="10" sz="quarter"/>
+            <p:ph type="body" sz="quarter" idx="10"/>
           </p:nvPr>
         </p:nvSpPr>
         <p:spPr/>
@@ -18859,7 +18977,7 @@
               <a:spcAft>
                 <a:spcPts val="400"/>
               </a:spcAft>
-              <a:defRPr b="1" sz="2200"/>
+              <a:defRPr sz="2200" b="1"/>
             </a:pPr>
             <a:r>
               <a:t>Retail &amp; E-commerce:</a:t>
@@ -18899,6 +19017,7 @@
                 <a:spcPts val="800"/>
               </a:spcAft>
             </a:pPr>
+            <a:endParaRPr/>
           </a:p>
           <a:p>
             <a:pPr>
@@ -18908,7 +19027,7 @@
               <a:spcAft>
                 <a:spcPts val="400"/>
               </a:spcAft>
-              <a:defRPr b="1" sz="2200"/>
+              <a:defRPr sz="2200" b="1"/>
             </a:pPr>
             <a:r>
               <a:t>Document Processing:</a:t>
@@ -20105,34 +20224,6 @@
 </file>
 
 <file path=customXml/item1.xml><?xml version="1.0" encoding="utf-8"?>
-<?mso-contentType ?>
-<FormTemplates xmlns="http://schemas.microsoft.com/sharepoint/v3/contenttype/forms">
-  <Display>DocumentLibraryForm</Display>
-  <Edit>DocumentLibraryForm</Edit>
-  <New>DocumentLibraryForm</New>
-</FormTemplates>
-</file>
-
-<file path=customXml/item2.xml><?xml version="1.0" encoding="utf-8"?>
-<p:properties xmlns:p="http://schemas.microsoft.com/office/2006/metadata/properties" xmlns:xsi="http://www.w3.org/2001/XMLSchema-instance" xmlns:pc="http://schemas.microsoft.com/office/infopath/2007/PartnerControls">
-  <documentManagement>
-    <SharedWithUsers xmlns="211ea7d1-7d09-49a0-8c96-644562ad20a0">
-      <UserInfo>
-        <DisplayName>Steve Crawford (Collabera)</DisplayName>
-        <AccountId>772</AccountId>
-        <AccountType/>
-      </UserInfo>
-    </SharedWithUsers>
-    <lcf76f155ced4ddcb4097134ff3c332f xmlns="b38ad2e8-7385-42ac-a943-76e9ea801cf0">
-      <Terms xmlns="http://schemas.microsoft.com/office/infopath/2007/PartnerControls"/>
-    </lcf76f155ced4ddcb4097134ff3c332f>
-    <TaxCatchAll xmlns="211ea7d1-7d09-49a0-8c96-644562ad20a0" xsi:nil="true"/>
-    <MediaLengthInSeconds xmlns="b38ad2e8-7385-42ac-a943-76e9ea801cf0" xsi:nil="true"/>
-  </documentManagement>
-</p:properties>
-</file>
-
-<file path=customXml/item3.xml><?xml version="1.0" encoding="utf-8"?>
 <ct:contentTypeSchema xmlns:ct="http://schemas.microsoft.com/office/2006/metadata/contentType" xmlns:ma="http://schemas.microsoft.com/office/2006/metadata/properties/metaAttributes" ct:_="" ma:_="" ma:contentTypeName="Document" ma:contentTypeID="0x0101000B4391967ADFE8469D6C015465AD315E" ma:contentTypeVersion="15" ma:contentTypeDescription="Create a new document." ma:contentTypeScope="" ma:versionID="76fd0cb1433b6b795f79a99bcf638f94">
   <xsd:schema xmlns:xsd="http://www.w3.org/2001/XMLSchema" xmlns:xs="http://www.w3.org/2001/XMLSchema" xmlns:p="http://schemas.microsoft.com/office/2006/metadata/properties" xmlns:ns2="b38ad2e8-7385-42ac-a943-76e9ea801cf0" xmlns:ns3="211ea7d1-7d09-49a0-8c96-644562ad20a0" targetNamespace="http://schemas.microsoft.com/office/2006/metadata/properties" ma:root="true" ma:fieldsID="cc1a838bf31f1e772520fd3ce2d1ad1f" ns2:_="" ns3:_="">
     <xsd:import namespace="b38ad2e8-7385-42ac-a943-76e9ea801cf0"/>
@@ -20367,10 +20458,49 @@
 </ct:contentTypeSchema>
 </file>
 
+<file path=customXml/item2.xml><?xml version="1.0" encoding="utf-8"?>
+<p:properties xmlns:p="http://schemas.microsoft.com/office/2006/metadata/properties" xmlns:xsi="http://www.w3.org/2001/XMLSchema-instance" xmlns:pc="http://schemas.microsoft.com/office/infopath/2007/PartnerControls">
+  <documentManagement>
+    <SharedWithUsers xmlns="211ea7d1-7d09-49a0-8c96-644562ad20a0">
+      <UserInfo>
+        <DisplayName>Steve Crawford (Collabera)</DisplayName>
+        <AccountId>772</AccountId>
+        <AccountType/>
+      </UserInfo>
+    </SharedWithUsers>
+    <lcf76f155ced4ddcb4097134ff3c332f xmlns="b38ad2e8-7385-42ac-a943-76e9ea801cf0">
+      <Terms xmlns="http://schemas.microsoft.com/office/infopath/2007/PartnerControls"/>
+    </lcf76f155ced4ddcb4097134ff3c332f>
+    <TaxCatchAll xmlns="211ea7d1-7d09-49a0-8c96-644562ad20a0" xsi:nil="true"/>
+    <MediaLengthInSeconds xmlns="b38ad2e8-7385-42ac-a943-76e9ea801cf0" xsi:nil="true"/>
+  </documentManagement>
+</p:properties>
+</file>
+
+<file path=customXml/item3.xml><?xml version="1.0" encoding="utf-8"?>
+<?mso-contentType ?>
+<FormTemplates xmlns="http://schemas.microsoft.com/sharepoint/v3/contenttype/forms">
+  <Display>DocumentLibraryForm</Display>
+  <Edit>DocumentLibraryForm</Edit>
+  <New>DocumentLibraryForm</New>
+</FormTemplates>
+</file>
+
 <file path=customXml/itemProps1.xml><?xml version="1.0" encoding="utf-8"?>
-<ds:datastoreItem xmlns:ds="http://schemas.openxmlformats.org/officeDocument/2006/customXml" ds:itemID="{758FDAC0-319D-4A54-8D8E-1D42CB1F8004}">
+<ds:datastoreItem xmlns:ds="http://schemas.openxmlformats.org/officeDocument/2006/customXml" ds:itemID="{5D94F210-A894-4561-8C89-A2786083C100}">
   <ds:schemaRefs>
-    <ds:schemaRef ds:uri="http://schemas.microsoft.com/sharepoint/v3/contenttype/forms"/>
+    <ds:schemaRef ds:uri="211ea7d1-7d09-49a0-8c96-644562ad20a0"/>
+    <ds:schemaRef ds:uri="b38ad2e8-7385-42ac-a943-76e9ea801cf0"/>
+    <ds:schemaRef ds:uri="http://purl.org/dc/elements/1.1/"/>
+    <ds:schemaRef ds:uri="http://purl.org/dc/terms/"/>
+    <ds:schemaRef ds:uri="http://schemas.microsoft.com/internal/obd"/>
+    <ds:schemaRef ds:uri="http://schemas.microsoft.com/office/2006/documentManagement/types"/>
+    <ds:schemaRef ds:uri="http://schemas.microsoft.com/office/2006/metadata/contentType"/>
+    <ds:schemaRef ds:uri="http://schemas.microsoft.com/office/2006/metadata/properties"/>
+    <ds:schemaRef ds:uri="http://schemas.microsoft.com/office/2006/metadata/properties/metaAttributes"/>
+    <ds:schemaRef ds:uri="http://schemas.microsoft.com/office/infopath/2007/PartnerControls"/>
+    <ds:schemaRef ds:uri="http://schemas.openxmlformats.org/package/2006/metadata/core-properties"/>
+    <ds:schemaRef ds:uri="http://www.w3.org/2001/XMLSchema"/>
   </ds:schemaRefs>
 </ds:datastoreItem>
 </file>
@@ -20393,20 +20523,9 @@
 </file>
 
 <file path=customXml/itemProps3.xml><?xml version="1.0" encoding="utf-8"?>
-<ds:datastoreItem xmlns:ds="http://schemas.openxmlformats.org/officeDocument/2006/customXml" ds:itemID="{5D94F210-A894-4561-8C89-A2786083C100}">
+<ds:datastoreItem xmlns:ds="http://schemas.openxmlformats.org/officeDocument/2006/customXml" ds:itemID="{758FDAC0-319D-4A54-8D8E-1D42CB1F8004}">
   <ds:schemaRefs>
-    <ds:schemaRef ds:uri="211ea7d1-7d09-49a0-8c96-644562ad20a0"/>
-    <ds:schemaRef ds:uri="b38ad2e8-7385-42ac-a943-76e9ea801cf0"/>
-    <ds:schemaRef ds:uri="http://purl.org/dc/elements/1.1/"/>
-    <ds:schemaRef ds:uri="http://purl.org/dc/terms/"/>
-    <ds:schemaRef ds:uri="http://schemas.microsoft.com/internal/obd"/>
-    <ds:schemaRef ds:uri="http://schemas.microsoft.com/office/2006/documentManagement/types"/>
-    <ds:schemaRef ds:uri="http://schemas.microsoft.com/office/2006/metadata/contentType"/>
-    <ds:schemaRef ds:uri="http://schemas.microsoft.com/office/2006/metadata/properties"/>
-    <ds:schemaRef ds:uri="http://schemas.microsoft.com/office/2006/metadata/properties/metaAttributes"/>
-    <ds:schemaRef ds:uri="http://schemas.microsoft.com/office/infopath/2007/PartnerControls"/>
-    <ds:schemaRef ds:uri="http://schemas.openxmlformats.org/package/2006/metadata/core-properties"/>
-    <ds:schemaRef ds:uri="http://www.w3.org/2001/XMLSchema"/>
+    <ds:schemaRef ds:uri="http://schemas.microsoft.com/sharepoint/v3/contenttype/forms"/>
   </ds:schemaRefs>
 </ds:datastoreItem>
 </file>

</xml_diff>